<commit_message>
Docs: adding data flow figure for 1st happy path demo
</commit_message>
<xml_diff>
--- a/Docs/Concept.pptx
+++ b/Docs/Concept.pptx
@@ -6,6 +6,7 @@
   </p:sldMasterIdLst>
   <p:sldIdLst>
     <p:sldId id="256" r:id="rId2"/>
+    <p:sldId id="257" r:id="rId3"/>
   </p:sldIdLst>
   <p:sldSz cx="12192000" cy="6858000"/>
   <p:notesSz cx="6858000" cy="9144000"/>
@@ -243,7 +244,7 @@
           <a:p>
             <a:fld id="{A138F55C-582E-4B71-904C-0AE799693AB9}" type="datetimeFigureOut">
               <a:rPr lang="en-US" smtClean="0"/>
-              <a:t>7/31/2017</a:t>
+              <a:t>8/5/2017</a:t>
             </a:fld>
             <a:endParaRPr lang="en-US"/>
           </a:p>
@@ -413,7 +414,7 @@
           <a:p>
             <a:fld id="{A138F55C-582E-4B71-904C-0AE799693AB9}" type="datetimeFigureOut">
               <a:rPr lang="en-US" smtClean="0"/>
-              <a:t>7/31/2017</a:t>
+              <a:t>8/5/2017</a:t>
             </a:fld>
             <a:endParaRPr lang="en-US"/>
           </a:p>
@@ -593,7 +594,7 @@
           <a:p>
             <a:fld id="{A138F55C-582E-4B71-904C-0AE799693AB9}" type="datetimeFigureOut">
               <a:rPr lang="en-US" smtClean="0"/>
-              <a:t>7/31/2017</a:t>
+              <a:t>8/5/2017</a:t>
             </a:fld>
             <a:endParaRPr lang="en-US"/>
           </a:p>
@@ -763,7 +764,7 @@
           <a:p>
             <a:fld id="{A138F55C-582E-4B71-904C-0AE799693AB9}" type="datetimeFigureOut">
               <a:rPr lang="en-US" smtClean="0"/>
-              <a:t>7/31/2017</a:t>
+              <a:t>8/5/2017</a:t>
             </a:fld>
             <a:endParaRPr lang="en-US"/>
           </a:p>
@@ -1009,7 +1010,7 @@
           <a:p>
             <a:fld id="{A138F55C-582E-4B71-904C-0AE799693AB9}" type="datetimeFigureOut">
               <a:rPr lang="en-US" smtClean="0"/>
-              <a:t>7/31/2017</a:t>
+              <a:t>8/5/2017</a:t>
             </a:fld>
             <a:endParaRPr lang="en-US"/>
           </a:p>
@@ -1241,7 +1242,7 @@
           <a:p>
             <a:fld id="{A138F55C-582E-4B71-904C-0AE799693AB9}" type="datetimeFigureOut">
               <a:rPr lang="en-US" smtClean="0"/>
-              <a:t>7/31/2017</a:t>
+              <a:t>8/5/2017</a:t>
             </a:fld>
             <a:endParaRPr lang="en-US"/>
           </a:p>
@@ -1608,7 +1609,7 @@
           <a:p>
             <a:fld id="{A138F55C-582E-4B71-904C-0AE799693AB9}" type="datetimeFigureOut">
               <a:rPr lang="en-US" smtClean="0"/>
-              <a:t>7/31/2017</a:t>
+              <a:t>8/5/2017</a:t>
             </a:fld>
             <a:endParaRPr lang="en-US"/>
           </a:p>
@@ -1726,7 +1727,7 @@
           <a:p>
             <a:fld id="{A138F55C-582E-4B71-904C-0AE799693AB9}" type="datetimeFigureOut">
               <a:rPr lang="en-US" smtClean="0"/>
-              <a:t>7/31/2017</a:t>
+              <a:t>8/5/2017</a:t>
             </a:fld>
             <a:endParaRPr lang="en-US"/>
           </a:p>
@@ -1821,7 +1822,7 @@
           <a:p>
             <a:fld id="{A138F55C-582E-4B71-904C-0AE799693AB9}" type="datetimeFigureOut">
               <a:rPr lang="en-US" smtClean="0"/>
-              <a:t>7/31/2017</a:t>
+              <a:t>8/5/2017</a:t>
             </a:fld>
             <a:endParaRPr lang="en-US"/>
           </a:p>
@@ -2098,7 +2099,7 @@
           <a:p>
             <a:fld id="{A138F55C-582E-4B71-904C-0AE799693AB9}" type="datetimeFigureOut">
               <a:rPr lang="en-US" smtClean="0"/>
-              <a:t>7/31/2017</a:t>
+              <a:t>8/5/2017</a:t>
             </a:fld>
             <a:endParaRPr lang="en-US"/>
           </a:p>
@@ -2351,7 +2352,7 @@
           <a:p>
             <a:fld id="{A138F55C-582E-4B71-904C-0AE799693AB9}" type="datetimeFigureOut">
               <a:rPr lang="en-US" smtClean="0"/>
-              <a:t>7/31/2017</a:t>
+              <a:t>8/5/2017</a:t>
             </a:fld>
             <a:endParaRPr lang="en-US"/>
           </a:p>
@@ -2564,7 +2565,7 @@
           <a:p>
             <a:fld id="{A138F55C-582E-4B71-904C-0AE799693AB9}" type="datetimeFigureOut">
               <a:rPr lang="en-US" smtClean="0"/>
-              <a:t>7/31/2017</a:t>
+              <a:t>8/5/2017</a:t>
             </a:fld>
             <a:endParaRPr lang="en-US"/>
           </a:p>
@@ -7913,6 +7914,1649 @@
 </p:sld>
 </file>
 
+<file path=ppt/slides/slide2.xml><?xml version="1.0" encoding="utf-8"?>
+<p:sld xmlns:a="http://schemas.openxmlformats.org/drawingml/2006/main" xmlns:r="http://schemas.openxmlformats.org/officeDocument/2006/relationships" xmlns:p="http://schemas.openxmlformats.org/presentationml/2006/main">
+  <p:cSld>
+    <p:spTree>
+      <p:nvGrpSpPr>
+        <p:cNvPr id="1" name=""/>
+        <p:cNvGrpSpPr/>
+        <p:nvPr/>
+      </p:nvGrpSpPr>
+      <p:grpSpPr>
+        <a:xfrm>
+          <a:off x="0" y="0"/>
+          <a:ext cx="0" cy="0"/>
+          <a:chOff x="0" y="0"/>
+          <a:chExt cx="0" cy="0"/>
+        </a:xfrm>
+      </p:grpSpPr>
+      <p:pic>
+        <p:nvPicPr>
+          <p:cNvPr id="7" name="Picture 6"/>
+          <p:cNvPicPr>
+            <a:picLocks noChangeAspect="1"/>
+          </p:cNvPicPr>
+          <p:nvPr/>
+        </p:nvPicPr>
+        <p:blipFill>
+          <a:blip r:embed="rId2"/>
+          <a:stretch>
+            <a:fillRect/>
+          </a:stretch>
+        </p:blipFill>
+        <p:spPr>
+          <a:xfrm>
+            <a:off x="483019" y="1404051"/>
+            <a:ext cx="4669132" cy="1870994"/>
+          </a:xfrm>
+          <a:prstGeom prst="rect">
+            <a:avLst/>
+          </a:prstGeom>
+          <a:ln>
+            <a:solidFill>
+              <a:schemeClr val="tx1"/>
+            </a:solidFill>
+            <a:prstDash val="dash"/>
+          </a:ln>
+          <a:effectLst>
+            <a:outerShdw blurRad="50800" dist="38100" dir="2700000" algn="tl" rotWithShape="0">
+              <a:prstClr val="black">
+                <a:alpha val="40000"/>
+              </a:prstClr>
+            </a:outerShdw>
+          </a:effectLst>
+        </p:spPr>
+      </p:pic>
+      <p:sp>
+        <p:nvSpPr>
+          <p:cNvPr id="9" name="Rectangle 1"/>
+          <p:cNvSpPr>
+            <a:spLocks noChangeArrowheads="1"/>
+          </p:cNvSpPr>
+          <p:nvPr/>
+        </p:nvSpPr>
+        <p:spPr bwMode="auto">
+          <a:xfrm>
+            <a:off x="4052179" y="230266"/>
+            <a:ext cx="4141783" cy="800219"/>
+          </a:xfrm>
+          <a:prstGeom prst="rect">
+            <a:avLst/>
+          </a:prstGeom>
+          <a:solidFill>
+            <a:srgbClr val="F6F8FA"/>
+          </a:solidFill>
+          <a:ln w="9525">
+            <a:solidFill>
+              <a:schemeClr val="tx1"/>
+            </a:solidFill>
+            <a:prstDash val="dash"/>
+            <a:miter lim="800000"/>
+            <a:headEnd/>
+            <a:tailEnd/>
+          </a:ln>
+          <a:effectLst>
+            <a:outerShdw dist="35921" dir="2700000" algn="ctr" rotWithShape="0">
+              <a:schemeClr val="bg2"/>
+            </a:outerShdw>
+          </a:effectLst>
+        </p:spPr>
+        <p:txBody>
+          <a:bodyPr vert="horz" wrap="square" lIns="91440" tIns="91440" rIns="91440" bIns="91440" numCol="1" anchor="ctr" anchorCtr="0" compatLnSpc="1">
+            <a:prstTxWarp prst="textNoShape">
+              <a:avLst/>
+            </a:prstTxWarp>
+            <a:spAutoFit/>
+          </a:bodyPr>
+          <a:lstStyle/>
+          <a:p>
+            <a:pPr marL="0" marR="0" lvl="0" indent="0" algn="l" defTabSz="914400" rtl="0" eaLnBrk="0" fontAlgn="base" latinLnBrk="0" hangingPunct="0">
+              <a:lnSpc>
+                <a:spcPct val="100000"/>
+              </a:lnSpc>
+              <a:spcBef>
+                <a:spcPct val="0"/>
+              </a:spcBef>
+              <a:spcAft>
+                <a:spcPct val="0"/>
+              </a:spcAft>
+              <a:buClrTx/>
+              <a:buSzTx/>
+              <a:buFontTx/>
+              <a:buNone/>
+              <a:tabLst/>
+            </a:pPr>
+            <a:r>
+              <a:rPr kumimoji="0" lang="en-US" altLang="en-US" sz="1000" b="0" i="0" u="none" strike="noStrike" cap="none" normalizeH="0" baseline="0" dirty="0" smtClean="0">
+                <a:ln>
+                  <a:noFill/>
+                </a:ln>
+                <a:solidFill>
+                  <a:srgbClr val="D73A49"/>
+                </a:solidFill>
+                <a:effectLst/>
+                <a:latin typeface="Consolas" panose="020B0609020204030204" pitchFamily="49" charset="0"/>
+              </a:rPr>
+              <a:t>POST</a:t>
+            </a:r>
+            <a:r>
+              <a:rPr kumimoji="0" lang="en-US" altLang="en-US" sz="1000" b="0" i="0" u="none" strike="noStrike" cap="none" normalizeH="0" baseline="0" dirty="0" smtClean="0">
+                <a:ln>
+                  <a:noFill/>
+                </a:ln>
+                <a:solidFill>
+                  <a:srgbClr val="24292E"/>
+                </a:solidFill>
+                <a:effectLst/>
+                <a:latin typeface="Consolas" panose="020B0609020204030204" pitchFamily="49" charset="0"/>
+              </a:rPr>
+              <a:t> http://localhost:</a:t>
+            </a:r>
+            <a:r>
+              <a:rPr kumimoji="0" lang="en-US" altLang="en-US" sz="1000" b="0" i="0" u="none" strike="noStrike" cap="none" normalizeH="0" baseline="0" dirty="0" smtClean="0">
+                <a:ln>
+                  <a:noFill/>
+                </a:ln>
+                <a:solidFill>
+                  <a:srgbClr val="005CC5"/>
+                </a:solidFill>
+                <a:effectLst/>
+                <a:latin typeface="Consolas" panose="020B0609020204030204" pitchFamily="49" charset="0"/>
+              </a:rPr>
+              <a:t>5000</a:t>
+            </a:r>
+            <a:r>
+              <a:rPr kumimoji="0" lang="en-US" altLang="en-US" sz="1000" b="0" i="0" u="none" strike="noStrike" cap="none" normalizeH="0" baseline="0" dirty="0" smtClean="0">
+                <a:ln>
+                  <a:noFill/>
+                </a:ln>
+                <a:solidFill>
+                  <a:srgbClr val="24292E"/>
+                </a:solidFill>
+                <a:effectLst/>
+                <a:latin typeface="Consolas" panose="020B0609020204030204" pitchFamily="49" charset="0"/>
+              </a:rPr>
+              <a:t>/tx/HelloWorld/Hello HTTP/</a:t>
+            </a:r>
+            <a:r>
+              <a:rPr kumimoji="0" lang="en-US" altLang="en-US" sz="1000" b="0" i="0" u="none" strike="noStrike" cap="none" normalizeH="0" baseline="0" dirty="0" smtClean="0">
+                <a:ln>
+                  <a:noFill/>
+                </a:ln>
+                <a:solidFill>
+                  <a:srgbClr val="005CC5"/>
+                </a:solidFill>
+                <a:effectLst/>
+                <a:latin typeface="Consolas" panose="020B0609020204030204" pitchFamily="49" charset="0"/>
+              </a:rPr>
+              <a:t>1.1</a:t>
+            </a:r>
+            <a:r>
+              <a:rPr kumimoji="0" lang="en-US" altLang="en-US" sz="1000" b="0" i="0" u="none" strike="noStrike" cap="none" normalizeH="0" baseline="0" dirty="0" smtClean="0">
+                <a:ln>
+                  <a:noFill/>
+                </a:ln>
+                <a:solidFill>
+                  <a:srgbClr val="24292E"/>
+                </a:solidFill>
+                <a:effectLst/>
+                <a:latin typeface="Consolas" panose="020B0609020204030204" pitchFamily="49" charset="0"/>
+              </a:rPr>
+              <a:t> </a:t>
+            </a:r>
+          </a:p>
+          <a:p>
+            <a:pPr marL="0" marR="0" lvl="0" indent="0" algn="l" defTabSz="914400" rtl="0" eaLnBrk="0" fontAlgn="base" latinLnBrk="0" hangingPunct="0">
+              <a:lnSpc>
+                <a:spcPct val="100000"/>
+              </a:lnSpc>
+              <a:spcBef>
+                <a:spcPct val="0"/>
+              </a:spcBef>
+              <a:spcAft>
+                <a:spcPct val="0"/>
+              </a:spcAft>
+              <a:buClrTx/>
+              <a:buSzTx/>
+              <a:buFontTx/>
+              <a:buNone/>
+              <a:tabLst/>
+            </a:pPr>
+            <a:r>
+              <a:rPr kumimoji="0" lang="en-US" altLang="en-US" sz="1000" b="0" i="0" u="none" strike="noStrike" cap="none" normalizeH="0" baseline="0" dirty="0" smtClean="0">
+                <a:ln>
+                  <a:noFill/>
+                </a:ln>
+                <a:solidFill>
+                  <a:srgbClr val="005CC5"/>
+                </a:solidFill>
+                <a:effectLst/>
+                <a:latin typeface="Consolas" panose="020B0609020204030204" pitchFamily="49" charset="0"/>
+              </a:rPr>
+              <a:t>Host:</a:t>
+            </a:r>
+            <a:r>
+              <a:rPr kumimoji="0" lang="en-US" altLang="en-US" sz="1000" b="0" i="0" u="none" strike="noStrike" cap="none" normalizeH="0" baseline="0" dirty="0" smtClean="0">
+                <a:ln>
+                  <a:noFill/>
+                </a:ln>
+                <a:solidFill>
+                  <a:srgbClr val="032F62"/>
+                </a:solidFill>
+                <a:effectLst/>
+                <a:latin typeface="Consolas" panose="020B0609020204030204" pitchFamily="49" charset="0"/>
+              </a:rPr>
+              <a:t> localhost:5000</a:t>
+            </a:r>
+            <a:r>
+              <a:rPr kumimoji="0" lang="en-US" altLang="en-US" sz="1000" b="0" i="0" u="none" strike="noStrike" cap="none" normalizeH="0" baseline="0" dirty="0" smtClean="0">
+                <a:ln>
+                  <a:noFill/>
+                </a:ln>
+                <a:solidFill>
+                  <a:srgbClr val="24292E"/>
+                </a:solidFill>
+                <a:effectLst/>
+                <a:latin typeface="Consolas" panose="020B0609020204030204" pitchFamily="49" charset="0"/>
+              </a:rPr>
+              <a:t> </a:t>
+            </a:r>
+          </a:p>
+          <a:p>
+            <a:pPr marL="0" marR="0" lvl="0" indent="0" algn="l" defTabSz="914400" rtl="0" eaLnBrk="0" fontAlgn="base" latinLnBrk="0" hangingPunct="0">
+              <a:lnSpc>
+                <a:spcPct val="100000"/>
+              </a:lnSpc>
+              <a:spcBef>
+                <a:spcPct val="0"/>
+              </a:spcBef>
+              <a:spcAft>
+                <a:spcPct val="0"/>
+              </a:spcAft>
+              <a:buClrTx/>
+              <a:buSzTx/>
+              <a:buFontTx/>
+              <a:buNone/>
+              <a:tabLst/>
+            </a:pPr>
+            <a:endParaRPr lang="en-US" altLang="en-US" sz="1000" dirty="0">
+              <a:solidFill>
+                <a:srgbClr val="24292E"/>
+              </a:solidFill>
+              <a:latin typeface="Consolas" panose="020B0609020204030204" pitchFamily="49" charset="0"/>
+            </a:endParaRPr>
+          </a:p>
+          <a:p>
+            <a:pPr marL="0" marR="0" lvl="0" indent="0" algn="l" defTabSz="914400" rtl="0" eaLnBrk="0" fontAlgn="base" latinLnBrk="0" hangingPunct="0">
+              <a:lnSpc>
+                <a:spcPct val="100000"/>
+              </a:lnSpc>
+              <a:spcBef>
+                <a:spcPct val="0"/>
+              </a:spcBef>
+              <a:spcAft>
+                <a:spcPct val="0"/>
+              </a:spcAft>
+              <a:buClrTx/>
+              <a:buSzTx/>
+              <a:buFontTx/>
+              <a:buNone/>
+              <a:tabLst/>
+            </a:pPr>
+            <a:r>
+              <a:rPr kumimoji="0" lang="en-US" altLang="en-US" sz="1000" b="0" i="0" u="none" strike="noStrike" cap="none" normalizeH="0" baseline="0" dirty="0" smtClean="0">
+                <a:ln>
+                  <a:noFill/>
+                </a:ln>
+                <a:solidFill>
+                  <a:srgbClr val="24292E"/>
+                </a:solidFill>
+                <a:effectLst/>
+                <a:latin typeface="Consolas" panose="020B0609020204030204" pitchFamily="49" charset="0"/>
+              </a:rPr>
+              <a:t>{</a:t>
+            </a:r>
+            <a:r>
+              <a:rPr kumimoji="0" lang="en-US" altLang="en-US" sz="1000" b="0" i="0" u="none" strike="noStrike" cap="none" normalizeH="0" baseline="0" dirty="0" smtClean="0">
+                <a:ln>
+                  <a:noFill/>
+                </a:ln>
+                <a:solidFill>
+                  <a:srgbClr val="032F62"/>
+                </a:solidFill>
+                <a:effectLst/>
+                <a:latin typeface="Consolas" panose="020B0609020204030204" pitchFamily="49" charset="0"/>
+              </a:rPr>
+              <a:t>"name"</a:t>
+            </a:r>
+            <a:r>
+              <a:rPr kumimoji="0" lang="en-US" altLang="en-US" sz="1000" b="0" i="0" u="none" strike="noStrike" cap="none" normalizeH="0" baseline="0" dirty="0" smtClean="0">
+                <a:ln>
+                  <a:noFill/>
+                </a:ln>
+                <a:solidFill>
+                  <a:srgbClr val="24292E"/>
+                </a:solidFill>
+                <a:effectLst/>
+                <a:latin typeface="Consolas" panose="020B0609020204030204" pitchFamily="49" charset="0"/>
+              </a:rPr>
+              <a:t>: </a:t>
+            </a:r>
+            <a:r>
+              <a:rPr kumimoji="0" lang="en-US" altLang="en-US" sz="1000" b="0" i="0" u="none" strike="noStrike" cap="none" normalizeH="0" baseline="0" dirty="0" smtClean="0">
+                <a:ln>
+                  <a:noFill/>
+                </a:ln>
+                <a:solidFill>
+                  <a:srgbClr val="032F62"/>
+                </a:solidFill>
+                <a:effectLst/>
+                <a:latin typeface="Consolas" panose="020B0609020204030204" pitchFamily="49" charset="0"/>
+              </a:rPr>
+              <a:t>“</a:t>
+            </a:r>
+            <a:r>
+              <a:rPr lang="en-US" altLang="en-US" sz="1000" dirty="0" err="1" smtClean="0">
+                <a:solidFill>
+                  <a:srgbClr val="032F62"/>
+                </a:solidFill>
+                <a:latin typeface="Consolas" panose="020B0609020204030204" pitchFamily="49" charset="0"/>
+              </a:rPr>
+              <a:t>nw</a:t>
+            </a:r>
+            <a:r>
+              <a:rPr kumimoji="0" lang="en-US" altLang="en-US" sz="1000" b="0" i="0" u="none" strike="noStrike" cap="none" normalizeH="0" baseline="0" dirty="0" err="1" smtClean="0">
+                <a:ln>
+                  <a:noFill/>
+                </a:ln>
+                <a:solidFill>
+                  <a:srgbClr val="032F62"/>
+                </a:solidFill>
+                <a:effectLst/>
+                <a:latin typeface="Consolas" panose="020B0609020204030204" pitchFamily="49" charset="0"/>
+              </a:rPr>
+              <a:t>heels</a:t>
+            </a:r>
+            <a:r>
+              <a:rPr kumimoji="0" lang="en-US" altLang="en-US" sz="1000" b="0" i="0" u="none" strike="noStrike" cap="none" normalizeH="0" baseline="0" dirty="0" smtClean="0">
+                <a:ln>
+                  <a:noFill/>
+                </a:ln>
+                <a:solidFill>
+                  <a:srgbClr val="032F62"/>
+                </a:solidFill>
+                <a:effectLst/>
+                <a:latin typeface="Consolas" panose="020B0609020204030204" pitchFamily="49" charset="0"/>
+              </a:rPr>
+              <a:t>"</a:t>
+            </a:r>
+            <a:r>
+              <a:rPr kumimoji="0" lang="en-US" altLang="en-US" sz="1000" b="0" i="0" u="none" strike="noStrike" cap="none" normalizeH="0" baseline="0" dirty="0" smtClean="0">
+                <a:ln>
+                  <a:noFill/>
+                </a:ln>
+                <a:solidFill>
+                  <a:srgbClr val="24292E"/>
+                </a:solidFill>
+                <a:effectLst/>
+                <a:latin typeface="Consolas" panose="020B0609020204030204" pitchFamily="49" charset="0"/>
+              </a:rPr>
+              <a:t>}</a:t>
+            </a:r>
+            <a:r>
+              <a:rPr kumimoji="0" lang="en-US" altLang="en-US" sz="900" b="0" i="0" u="none" strike="noStrike" cap="none" normalizeH="0" baseline="0" dirty="0" smtClean="0">
+                <a:ln>
+                  <a:noFill/>
+                </a:ln>
+                <a:solidFill>
+                  <a:schemeClr val="tx1"/>
+                </a:solidFill>
+                <a:effectLst/>
+                <a:latin typeface="Consolas" panose="020B0609020204030204" pitchFamily="49" charset="0"/>
+              </a:rPr>
+              <a:t> </a:t>
+            </a:r>
+            <a:endParaRPr kumimoji="0" lang="en-US" altLang="en-US" sz="2000" b="0" i="0" u="none" strike="noStrike" cap="none" normalizeH="0" baseline="0" dirty="0" smtClean="0">
+              <a:ln>
+                <a:noFill/>
+              </a:ln>
+              <a:solidFill>
+                <a:schemeClr val="tx1"/>
+              </a:solidFill>
+              <a:effectLst/>
+              <a:latin typeface="Consolas" panose="020B0609020204030204" pitchFamily="49" charset="0"/>
+            </a:endParaRPr>
+          </a:p>
+        </p:txBody>
+      </p:sp>
+      <p:sp>
+        <p:nvSpPr>
+          <p:cNvPr id="10" name="Rectangle 2"/>
+          <p:cNvSpPr>
+            <a:spLocks noChangeArrowheads="1"/>
+          </p:cNvSpPr>
+          <p:nvPr/>
+        </p:nvSpPr>
+        <p:spPr bwMode="auto">
+          <a:xfrm>
+            <a:off x="4052179" y="3748698"/>
+            <a:ext cx="4141783" cy="954107"/>
+          </a:xfrm>
+          <a:prstGeom prst="rect">
+            <a:avLst/>
+          </a:prstGeom>
+          <a:solidFill>
+            <a:srgbClr val="F6F8FA"/>
+          </a:solidFill>
+          <a:ln w="9525">
+            <a:solidFill>
+              <a:schemeClr val="tx1"/>
+            </a:solidFill>
+            <a:prstDash val="dash"/>
+            <a:miter lim="800000"/>
+            <a:headEnd/>
+            <a:tailEnd/>
+          </a:ln>
+          <a:effectLst>
+            <a:outerShdw dist="35921" dir="2700000" algn="ctr" rotWithShape="0">
+              <a:schemeClr val="bg2"/>
+            </a:outerShdw>
+          </a:effectLst>
+        </p:spPr>
+        <p:txBody>
+          <a:bodyPr vert="horz" wrap="square" lIns="91440" tIns="91440" rIns="91440" bIns="91440" numCol="1" anchor="ctr" anchorCtr="0" compatLnSpc="1">
+            <a:prstTxWarp prst="textNoShape">
+              <a:avLst/>
+            </a:prstTxWarp>
+            <a:spAutoFit/>
+          </a:bodyPr>
+          <a:lstStyle/>
+          <a:p>
+            <a:pPr marL="0" marR="0" lvl="0" indent="0" algn="l" defTabSz="914400" rtl="0" eaLnBrk="0" fontAlgn="base" latinLnBrk="0" hangingPunct="0">
+              <a:lnSpc>
+                <a:spcPct val="100000"/>
+              </a:lnSpc>
+              <a:spcBef>
+                <a:spcPct val="0"/>
+              </a:spcBef>
+              <a:spcAft>
+                <a:spcPct val="0"/>
+              </a:spcAft>
+              <a:buClrTx/>
+              <a:buSzTx/>
+              <a:buFontTx/>
+              <a:buNone/>
+              <a:tabLst/>
+            </a:pPr>
+            <a:r>
+              <a:rPr kumimoji="0" lang="en-US" altLang="en-US" sz="1000" b="0" i="0" u="none" strike="noStrike" cap="none" normalizeH="0" baseline="0" dirty="0" smtClean="0">
+                <a:ln>
+                  <a:noFill/>
+                </a:ln>
+                <a:solidFill>
+                  <a:srgbClr val="24292E"/>
+                </a:solidFill>
+                <a:effectLst/>
+                <a:latin typeface="Consolas" panose="020B0609020204030204" pitchFamily="49" charset="0"/>
+              </a:rPr>
+              <a:t>HTTP/</a:t>
+            </a:r>
+            <a:r>
+              <a:rPr kumimoji="0" lang="en-US" altLang="en-US" sz="1000" b="0" i="0" u="none" strike="noStrike" cap="none" normalizeH="0" baseline="0" dirty="0" smtClean="0">
+                <a:ln>
+                  <a:noFill/>
+                </a:ln>
+                <a:solidFill>
+                  <a:srgbClr val="005CC5"/>
+                </a:solidFill>
+                <a:effectLst/>
+                <a:latin typeface="Consolas" panose="020B0609020204030204" pitchFamily="49" charset="0"/>
+              </a:rPr>
+              <a:t>1.1</a:t>
+            </a:r>
+            <a:r>
+              <a:rPr kumimoji="0" lang="en-US" altLang="en-US" sz="1000" b="0" i="0" u="none" strike="noStrike" cap="none" normalizeH="0" baseline="0" dirty="0" smtClean="0">
+                <a:ln>
+                  <a:noFill/>
+                </a:ln>
+                <a:solidFill>
+                  <a:srgbClr val="24292E"/>
+                </a:solidFill>
+                <a:effectLst/>
+                <a:latin typeface="Consolas" panose="020B0609020204030204" pitchFamily="49" charset="0"/>
+              </a:rPr>
+              <a:t> </a:t>
+            </a:r>
+            <a:r>
+              <a:rPr kumimoji="0" lang="en-US" altLang="en-US" sz="1000" b="0" i="0" u="none" strike="noStrike" cap="none" normalizeH="0" baseline="0" dirty="0" smtClean="0">
+                <a:ln>
+                  <a:noFill/>
+                </a:ln>
+                <a:solidFill>
+                  <a:srgbClr val="005CC5"/>
+                </a:solidFill>
+                <a:effectLst/>
+                <a:latin typeface="Consolas" panose="020B0609020204030204" pitchFamily="49" charset="0"/>
+              </a:rPr>
+              <a:t>200</a:t>
+            </a:r>
+            <a:r>
+              <a:rPr kumimoji="0" lang="en-US" altLang="en-US" sz="1000" b="0" i="0" u="none" strike="noStrike" cap="none" normalizeH="0" baseline="0" dirty="0" smtClean="0">
+                <a:ln>
+                  <a:noFill/>
+                </a:ln>
+                <a:solidFill>
+                  <a:srgbClr val="24292E"/>
+                </a:solidFill>
+                <a:effectLst/>
+                <a:latin typeface="Consolas" panose="020B0609020204030204" pitchFamily="49" charset="0"/>
+              </a:rPr>
+              <a:t> OK </a:t>
+            </a:r>
+          </a:p>
+          <a:p>
+            <a:pPr marL="0" marR="0" lvl="0" indent="0" algn="l" defTabSz="914400" rtl="0" eaLnBrk="0" fontAlgn="base" latinLnBrk="0" hangingPunct="0">
+              <a:lnSpc>
+                <a:spcPct val="100000"/>
+              </a:lnSpc>
+              <a:spcBef>
+                <a:spcPct val="0"/>
+              </a:spcBef>
+              <a:spcAft>
+                <a:spcPct val="0"/>
+              </a:spcAft>
+              <a:buClrTx/>
+              <a:buSzTx/>
+              <a:buFontTx/>
+              <a:buNone/>
+              <a:tabLst/>
+            </a:pPr>
+            <a:r>
+              <a:rPr kumimoji="0" lang="en-US" altLang="en-US" sz="1000" b="0" i="0" u="none" strike="noStrike" cap="none" normalizeH="0" baseline="0" dirty="0" smtClean="0">
+                <a:ln>
+                  <a:noFill/>
+                </a:ln>
+                <a:solidFill>
+                  <a:srgbClr val="005CC5"/>
+                </a:solidFill>
+                <a:effectLst/>
+                <a:latin typeface="Consolas" panose="020B0609020204030204" pitchFamily="49" charset="0"/>
+              </a:rPr>
+              <a:t>Content-Type:</a:t>
+            </a:r>
+            <a:r>
+              <a:rPr kumimoji="0" lang="en-US" altLang="en-US" sz="1000" b="0" i="0" u="none" strike="noStrike" cap="none" normalizeH="0" baseline="0" dirty="0" smtClean="0">
+                <a:ln>
+                  <a:noFill/>
+                </a:ln>
+                <a:solidFill>
+                  <a:srgbClr val="032F62"/>
+                </a:solidFill>
+                <a:effectLst/>
+                <a:latin typeface="Consolas" panose="020B0609020204030204" pitchFamily="49" charset="0"/>
+              </a:rPr>
+              <a:t> application/</a:t>
+            </a:r>
+            <a:r>
+              <a:rPr kumimoji="0" lang="en-US" altLang="en-US" sz="1000" b="0" i="0" u="none" strike="noStrike" cap="none" normalizeH="0" baseline="0" dirty="0" err="1" smtClean="0">
+                <a:ln>
+                  <a:noFill/>
+                </a:ln>
+                <a:solidFill>
+                  <a:srgbClr val="032F62"/>
+                </a:solidFill>
+                <a:effectLst/>
+                <a:latin typeface="Consolas" panose="020B0609020204030204" pitchFamily="49" charset="0"/>
+              </a:rPr>
+              <a:t>json</a:t>
+            </a:r>
+            <a:r>
+              <a:rPr kumimoji="0" lang="en-US" altLang="en-US" sz="1000" b="0" i="0" u="none" strike="noStrike" cap="none" normalizeH="0" baseline="0" dirty="0" smtClean="0">
+                <a:ln>
+                  <a:noFill/>
+                </a:ln>
+                <a:solidFill>
+                  <a:srgbClr val="24292E"/>
+                </a:solidFill>
+                <a:effectLst/>
+                <a:latin typeface="Consolas" panose="020B0609020204030204" pitchFamily="49" charset="0"/>
+              </a:rPr>
+              <a:t> </a:t>
+            </a:r>
+          </a:p>
+          <a:p>
+            <a:pPr marL="0" marR="0" lvl="0" indent="0" algn="l" defTabSz="914400" rtl="0" eaLnBrk="0" fontAlgn="base" latinLnBrk="0" hangingPunct="0">
+              <a:lnSpc>
+                <a:spcPct val="100000"/>
+              </a:lnSpc>
+              <a:spcBef>
+                <a:spcPct val="0"/>
+              </a:spcBef>
+              <a:spcAft>
+                <a:spcPct val="0"/>
+              </a:spcAft>
+              <a:buClrTx/>
+              <a:buSzTx/>
+              <a:buFontTx/>
+              <a:buNone/>
+              <a:tabLst/>
+            </a:pPr>
+            <a:r>
+              <a:rPr kumimoji="0" lang="en-US" altLang="en-US" sz="1000" b="0" i="0" u="none" strike="noStrike" cap="none" normalizeH="0" baseline="0" dirty="0" smtClean="0">
+                <a:ln>
+                  <a:noFill/>
+                </a:ln>
+                <a:solidFill>
+                  <a:srgbClr val="005CC5"/>
+                </a:solidFill>
+                <a:effectLst/>
+                <a:latin typeface="Consolas" panose="020B0609020204030204" pitchFamily="49" charset="0"/>
+              </a:rPr>
+              <a:t>Server:</a:t>
+            </a:r>
+            <a:r>
+              <a:rPr kumimoji="0" lang="en-US" altLang="en-US" sz="1000" b="0" i="0" u="none" strike="noStrike" cap="none" normalizeH="0" baseline="0" dirty="0" smtClean="0">
+                <a:ln>
+                  <a:noFill/>
+                </a:ln>
+                <a:solidFill>
+                  <a:srgbClr val="032F62"/>
+                </a:solidFill>
+                <a:effectLst/>
+                <a:latin typeface="Consolas" panose="020B0609020204030204" pitchFamily="49" charset="0"/>
+              </a:rPr>
+              <a:t> Kestrel</a:t>
+            </a:r>
+            <a:r>
+              <a:rPr kumimoji="0" lang="en-US" altLang="en-US" sz="1000" b="0" i="0" u="none" strike="noStrike" cap="none" normalizeH="0" baseline="0" dirty="0" smtClean="0">
+                <a:ln>
+                  <a:noFill/>
+                </a:ln>
+                <a:solidFill>
+                  <a:srgbClr val="24292E"/>
+                </a:solidFill>
+                <a:effectLst/>
+                <a:latin typeface="Consolas" panose="020B0609020204030204" pitchFamily="49" charset="0"/>
+              </a:rPr>
+              <a:t> </a:t>
+            </a:r>
+          </a:p>
+          <a:p>
+            <a:pPr marL="0" marR="0" lvl="0" indent="0" algn="l" defTabSz="914400" rtl="0" eaLnBrk="0" fontAlgn="base" latinLnBrk="0" hangingPunct="0">
+              <a:lnSpc>
+                <a:spcPct val="100000"/>
+              </a:lnSpc>
+              <a:spcBef>
+                <a:spcPct val="0"/>
+              </a:spcBef>
+              <a:spcAft>
+                <a:spcPct val="0"/>
+              </a:spcAft>
+              <a:buClrTx/>
+              <a:buSzTx/>
+              <a:buFontTx/>
+              <a:buNone/>
+              <a:tabLst/>
+            </a:pPr>
+            <a:endParaRPr lang="en-US" altLang="en-US" sz="1000" dirty="0">
+              <a:solidFill>
+                <a:srgbClr val="24292E"/>
+              </a:solidFill>
+              <a:latin typeface="Consolas" panose="020B0609020204030204" pitchFamily="49" charset="0"/>
+            </a:endParaRPr>
+          </a:p>
+          <a:p>
+            <a:pPr marL="0" marR="0" lvl="0" indent="0" algn="l" defTabSz="914400" rtl="0" eaLnBrk="0" fontAlgn="base" latinLnBrk="0" hangingPunct="0">
+              <a:lnSpc>
+                <a:spcPct val="100000"/>
+              </a:lnSpc>
+              <a:spcBef>
+                <a:spcPct val="0"/>
+              </a:spcBef>
+              <a:spcAft>
+                <a:spcPct val="0"/>
+              </a:spcAft>
+              <a:buClrTx/>
+              <a:buSzTx/>
+              <a:buFontTx/>
+              <a:buNone/>
+              <a:tabLst/>
+            </a:pPr>
+            <a:r>
+              <a:rPr kumimoji="0" lang="en-US" altLang="en-US" sz="1000" b="0" i="0" u="none" strike="noStrike" cap="none" normalizeH="0" baseline="0" dirty="0" smtClean="0">
+                <a:ln>
+                  <a:noFill/>
+                </a:ln>
+                <a:solidFill>
+                  <a:srgbClr val="24292E"/>
+                </a:solidFill>
+                <a:effectLst/>
+                <a:latin typeface="Consolas" panose="020B0609020204030204" pitchFamily="49" charset="0"/>
+              </a:rPr>
+              <a:t>{</a:t>
+            </a:r>
+            <a:r>
+              <a:rPr kumimoji="0" lang="en-US" altLang="en-US" sz="1000" b="0" i="0" u="none" strike="noStrike" cap="none" normalizeH="0" baseline="0" dirty="0" smtClean="0">
+                <a:ln>
+                  <a:noFill/>
+                </a:ln>
+                <a:solidFill>
+                  <a:srgbClr val="032F62"/>
+                </a:solidFill>
+                <a:effectLst/>
+                <a:latin typeface="Consolas" panose="020B0609020204030204" pitchFamily="49" charset="0"/>
+              </a:rPr>
+              <a:t>"</a:t>
+            </a:r>
+            <a:r>
+              <a:rPr kumimoji="0" lang="en-US" altLang="en-US" sz="1000" b="0" i="0" u="none" strike="noStrike" cap="none" normalizeH="0" baseline="0" dirty="0" err="1" smtClean="0">
+                <a:ln>
+                  <a:noFill/>
+                </a:ln>
+                <a:solidFill>
+                  <a:srgbClr val="032F62"/>
+                </a:solidFill>
+                <a:effectLst/>
+                <a:latin typeface="Consolas" panose="020B0609020204030204" pitchFamily="49" charset="0"/>
+              </a:rPr>
+              <a:t>result"</a:t>
+            </a:r>
+            <a:r>
+              <a:rPr kumimoji="0" lang="en-US" altLang="en-US" sz="1000" b="0" i="0" u="none" strike="noStrike" cap="none" normalizeH="0" baseline="0" dirty="0" err="1" smtClean="0">
+                <a:ln>
+                  <a:noFill/>
+                </a:ln>
+                <a:solidFill>
+                  <a:srgbClr val="24292E"/>
+                </a:solidFill>
+                <a:effectLst/>
+                <a:latin typeface="Consolas" panose="020B0609020204030204" pitchFamily="49" charset="0"/>
+              </a:rPr>
+              <a:t>:</a:t>
+            </a:r>
+            <a:r>
+              <a:rPr kumimoji="0" lang="en-US" altLang="en-US" sz="1000" b="0" i="0" u="none" strike="noStrike" cap="none" normalizeH="0" baseline="0" dirty="0" err="1" smtClean="0">
+                <a:ln>
+                  <a:noFill/>
+                </a:ln>
+                <a:solidFill>
+                  <a:srgbClr val="032F62"/>
+                </a:solidFill>
+                <a:effectLst/>
+                <a:latin typeface="Consolas" panose="020B0609020204030204" pitchFamily="49" charset="0"/>
+              </a:rPr>
+              <a:t>"Hello</a:t>
+            </a:r>
+            <a:r>
+              <a:rPr kumimoji="0" lang="en-US" altLang="en-US" sz="1000" b="0" i="0" u="none" strike="noStrike" cap="none" normalizeH="0" baseline="0" dirty="0" smtClean="0">
+                <a:ln>
+                  <a:noFill/>
+                </a:ln>
+                <a:solidFill>
+                  <a:srgbClr val="032F62"/>
+                </a:solidFill>
+                <a:effectLst/>
+                <a:latin typeface="Consolas" panose="020B0609020204030204" pitchFamily="49" charset="0"/>
+              </a:rPr>
+              <a:t> world, from </a:t>
+            </a:r>
+            <a:r>
+              <a:rPr kumimoji="0" lang="en-US" altLang="en-US" sz="1000" b="0" i="0" u="none" strike="noStrike" cap="none" normalizeH="0" baseline="0" dirty="0" err="1" smtClean="0">
+                <a:ln>
+                  <a:noFill/>
+                </a:ln>
+                <a:solidFill>
+                  <a:srgbClr val="032F62"/>
+                </a:solidFill>
+                <a:effectLst/>
+                <a:latin typeface="Consolas" panose="020B0609020204030204" pitchFamily="49" charset="0"/>
+              </a:rPr>
+              <a:t>nwheels</a:t>
+            </a:r>
+            <a:r>
+              <a:rPr kumimoji="0" lang="en-US" altLang="en-US" sz="1000" b="0" i="0" u="none" strike="noStrike" cap="none" normalizeH="0" baseline="0" dirty="0" smtClean="0">
+                <a:ln>
+                  <a:noFill/>
+                </a:ln>
+                <a:solidFill>
+                  <a:srgbClr val="032F62"/>
+                </a:solidFill>
+                <a:effectLst/>
+                <a:latin typeface="Consolas" panose="020B0609020204030204" pitchFamily="49" charset="0"/>
+              </a:rPr>
+              <a:t>!"</a:t>
+            </a:r>
+            <a:r>
+              <a:rPr kumimoji="0" lang="en-US" altLang="en-US" sz="1000" b="0" i="0" u="none" strike="noStrike" cap="none" normalizeH="0" baseline="0" dirty="0" smtClean="0">
+                <a:ln>
+                  <a:noFill/>
+                </a:ln>
+                <a:solidFill>
+                  <a:srgbClr val="24292E"/>
+                </a:solidFill>
+                <a:effectLst/>
+                <a:latin typeface="Consolas" panose="020B0609020204030204" pitchFamily="49" charset="0"/>
+              </a:rPr>
+              <a:t>}</a:t>
+            </a:r>
+            <a:r>
+              <a:rPr kumimoji="0" lang="en-US" altLang="en-US" sz="900" b="0" i="0" u="none" strike="noStrike" cap="none" normalizeH="0" baseline="0" dirty="0" smtClean="0">
+                <a:ln>
+                  <a:noFill/>
+                </a:ln>
+                <a:solidFill>
+                  <a:schemeClr val="tx1"/>
+                </a:solidFill>
+                <a:effectLst/>
+                <a:latin typeface="Consolas" panose="020B0609020204030204" pitchFamily="49" charset="0"/>
+              </a:rPr>
+              <a:t> </a:t>
+            </a:r>
+            <a:endParaRPr kumimoji="0" lang="en-US" altLang="en-US" sz="2000" b="0" i="0" u="none" strike="noStrike" cap="none" normalizeH="0" baseline="0" dirty="0" smtClean="0">
+              <a:ln>
+                <a:noFill/>
+              </a:ln>
+              <a:solidFill>
+                <a:schemeClr val="tx1"/>
+              </a:solidFill>
+              <a:effectLst/>
+              <a:latin typeface="Consolas" panose="020B0609020204030204" pitchFamily="49" charset="0"/>
+            </a:endParaRPr>
+          </a:p>
+        </p:txBody>
+      </p:sp>
+      <p:grpSp>
+        <p:nvGrpSpPr>
+          <p:cNvPr id="11" name="Group 10"/>
+          <p:cNvGrpSpPr/>
+          <p:nvPr/>
+        </p:nvGrpSpPr>
+        <p:grpSpPr>
+          <a:xfrm>
+            <a:off x="5519293" y="1751505"/>
+            <a:ext cx="1207551" cy="1173578"/>
+            <a:chOff x="10896863" y="2204270"/>
+            <a:chExt cx="1019884" cy="1061444"/>
+          </a:xfrm>
+        </p:grpSpPr>
+        <p:sp>
+          <p:nvSpPr>
+            <p:cNvPr id="114" name="Hexagon 113"/>
+            <p:cNvSpPr/>
+            <p:nvPr/>
+          </p:nvSpPr>
+          <p:spPr>
+            <a:xfrm rot="16200000">
+              <a:off x="10876083" y="2279479"/>
+              <a:ext cx="1061444" cy="911025"/>
+            </a:xfrm>
+            <a:prstGeom prst="hexagon">
+              <a:avLst>
+                <a:gd name="adj" fmla="val 29448"/>
+                <a:gd name="vf" fmla="val 115470"/>
+              </a:avLst>
+            </a:prstGeom>
+            <a:solidFill>
+              <a:schemeClr val="bg1"/>
+            </a:solidFill>
+            <a:ln w="19050">
+              <a:solidFill>
+                <a:srgbClr val="00B050"/>
+              </a:solidFill>
+            </a:ln>
+            <a:effectLst>
+              <a:outerShdw blurRad="50800" dist="38100" dir="2700000" algn="tl" rotWithShape="0">
+                <a:prstClr val="black">
+                  <a:alpha val="40000"/>
+                </a:prstClr>
+              </a:outerShdw>
+            </a:effectLst>
+          </p:spPr>
+          <p:style>
+            <a:lnRef idx="2">
+              <a:schemeClr val="accent1">
+                <a:shade val="50000"/>
+              </a:schemeClr>
+            </a:lnRef>
+            <a:fillRef idx="1">
+              <a:schemeClr val="accent1"/>
+            </a:fillRef>
+            <a:effectRef idx="0">
+              <a:schemeClr val="accent1"/>
+            </a:effectRef>
+            <a:fontRef idx="minor">
+              <a:schemeClr val="lt1"/>
+            </a:fontRef>
+          </p:style>
+          <p:txBody>
+            <a:bodyPr lIns="0" tIns="0" rIns="0" bIns="0" rtlCol="0" anchor="ctr"/>
+            <a:lstStyle/>
+            <a:p>
+              <a:pPr algn="ctr">
+                <a:lnSpc>
+                  <a:spcPct val="80000"/>
+                </a:lnSpc>
+              </a:pPr>
+              <a:r>
+                <a:rPr lang="en-US" sz="1200" spc="-50" dirty="0" smtClean="0">
+                  <a:solidFill>
+                    <a:srgbClr val="0070C0"/>
+                  </a:solidFill>
+                </a:rPr>
+                <a:t/>
+              </a:r>
+              <a:br>
+                <a:rPr lang="en-US" sz="1200" spc="-50" dirty="0" smtClean="0">
+                  <a:solidFill>
+                    <a:srgbClr val="0070C0"/>
+                  </a:solidFill>
+                </a:rPr>
+              </a:br>
+              <a:r>
+                <a:rPr lang="en-US" sz="1200" spc="-50" dirty="0" smtClean="0">
+                  <a:solidFill>
+                    <a:srgbClr val="0070C0"/>
+                  </a:solidFill>
+                </a:rPr>
+                <a:t/>
+              </a:r>
+              <a:br>
+                <a:rPr lang="en-US" sz="1200" spc="-50" dirty="0" smtClean="0">
+                  <a:solidFill>
+                    <a:srgbClr val="0070C0"/>
+                  </a:solidFill>
+                </a:rPr>
+              </a:br>
+              <a:endParaRPr lang="en-US" sz="1200" spc="-50" dirty="0" smtClean="0">
+                <a:solidFill>
+                  <a:srgbClr val="0070C0"/>
+                </a:solidFill>
+              </a:endParaRPr>
+            </a:p>
+          </p:txBody>
+        </p:sp>
+        <p:sp>
+          <p:nvSpPr>
+            <p:cNvPr id="116" name="TextBox 115"/>
+            <p:cNvSpPr txBox="1"/>
+            <p:nvPr/>
+          </p:nvSpPr>
+          <p:spPr>
+            <a:xfrm>
+              <a:off x="10896863" y="2566435"/>
+              <a:ext cx="1019884" cy="176651"/>
+            </a:xfrm>
+            <a:prstGeom prst="rect">
+              <a:avLst/>
+            </a:prstGeom>
+            <a:noFill/>
+          </p:spPr>
+          <p:txBody>
+            <a:bodyPr wrap="square" lIns="0" tIns="0" rIns="0" bIns="0" rtlCol="0">
+              <a:spAutoFit/>
+            </a:bodyPr>
+            <a:lstStyle/>
+            <a:p>
+              <a:pPr algn="ctr">
+                <a:lnSpc>
+                  <a:spcPct val="80000"/>
+                </a:lnSpc>
+              </a:pPr>
+              <a:r>
+                <a:rPr lang="en-US" sz="1400" spc="-50" dirty="0" err="1" smtClean="0">
+                  <a:solidFill>
+                    <a:srgbClr val="0070C0"/>
+                  </a:solidFill>
+                </a:rPr>
+                <a:t>microservice</a:t>
+              </a:r>
+              <a:endParaRPr lang="en-US" sz="1400" dirty="0"/>
+            </a:p>
+          </p:txBody>
+        </p:sp>
+      </p:grpSp>
+      <p:sp>
+        <p:nvSpPr>
+          <p:cNvPr id="13" name="Rectangle 3"/>
+          <p:cNvSpPr>
+            <a:spLocks noChangeArrowheads="1"/>
+          </p:cNvSpPr>
+          <p:nvPr/>
+        </p:nvSpPr>
+        <p:spPr bwMode="auto">
+          <a:xfrm>
+            <a:off x="7093988" y="2064121"/>
+            <a:ext cx="3346968" cy="800219"/>
+          </a:xfrm>
+          <a:prstGeom prst="rect">
+            <a:avLst/>
+          </a:prstGeom>
+          <a:solidFill>
+            <a:srgbClr val="F6F8FA"/>
+          </a:solidFill>
+          <a:ln w="9525">
+            <a:solidFill>
+              <a:schemeClr val="tx1"/>
+            </a:solidFill>
+            <a:prstDash val="dash"/>
+            <a:miter lim="800000"/>
+            <a:headEnd/>
+            <a:tailEnd/>
+          </a:ln>
+          <a:effectLst>
+            <a:outerShdw dist="35921" dir="2700000" algn="ctr" rotWithShape="0">
+              <a:schemeClr val="bg2"/>
+            </a:outerShdw>
+          </a:effectLst>
+        </p:spPr>
+        <p:txBody>
+          <a:bodyPr vert="horz" wrap="square" lIns="91440" tIns="91440" rIns="91440" bIns="91440" numCol="1" anchor="ctr" anchorCtr="0" compatLnSpc="1">
+            <a:prstTxWarp prst="textNoShape">
+              <a:avLst/>
+            </a:prstTxWarp>
+            <a:spAutoFit/>
+          </a:bodyPr>
+          <a:lstStyle/>
+          <a:p>
+            <a:pPr marL="0" marR="0" lvl="0" indent="0" algn="l" defTabSz="914400" rtl="0" eaLnBrk="0" fontAlgn="base" latinLnBrk="0" hangingPunct="0">
+              <a:lnSpc>
+                <a:spcPct val="100000"/>
+              </a:lnSpc>
+              <a:spcBef>
+                <a:spcPct val="0"/>
+              </a:spcBef>
+              <a:spcAft>
+                <a:spcPct val="0"/>
+              </a:spcAft>
+              <a:buClrTx/>
+              <a:buSzTx/>
+              <a:buFontTx/>
+              <a:buNone/>
+              <a:tabLst/>
+            </a:pPr>
+            <a:r>
+              <a:rPr kumimoji="0" lang="en-US" altLang="en-US" sz="1000" b="0" i="0" u="none" strike="noStrike" cap="none" normalizeH="0" baseline="0" dirty="0" smtClean="0">
+                <a:ln>
+                  <a:noFill/>
+                </a:ln>
+                <a:solidFill>
+                  <a:srgbClr val="D73A49"/>
+                </a:solidFill>
+                <a:effectLst/>
+                <a:latin typeface="Consolas" panose="020B0609020204030204" pitchFamily="49" charset="0"/>
+              </a:rPr>
+              <a:t>public</a:t>
+            </a:r>
+            <a:r>
+              <a:rPr kumimoji="0" lang="en-US" altLang="en-US" sz="1000" b="0" i="0" u="none" strike="noStrike" cap="none" normalizeH="0" baseline="0" dirty="0" smtClean="0">
+                <a:ln>
+                  <a:noFill/>
+                </a:ln>
+                <a:solidFill>
+                  <a:srgbClr val="24292E"/>
+                </a:solidFill>
+                <a:effectLst/>
+                <a:latin typeface="Consolas" panose="020B0609020204030204" pitchFamily="49" charset="0"/>
+              </a:rPr>
+              <a:t> </a:t>
+            </a:r>
+            <a:r>
+              <a:rPr kumimoji="0" lang="en-US" altLang="en-US" sz="1000" b="0" i="0" u="none" strike="noStrike" cap="none" normalizeH="0" baseline="0" dirty="0" err="1" smtClean="0">
+                <a:ln>
+                  <a:noFill/>
+                </a:ln>
+                <a:solidFill>
+                  <a:srgbClr val="D73A49"/>
+                </a:solidFill>
+                <a:effectLst/>
+                <a:latin typeface="Consolas" panose="020B0609020204030204" pitchFamily="49" charset="0"/>
+              </a:rPr>
+              <a:t>async</a:t>
+            </a:r>
+            <a:r>
+              <a:rPr kumimoji="0" lang="en-US" altLang="en-US" sz="1000" b="0" i="0" u="none" strike="noStrike" cap="none" normalizeH="0" baseline="0" dirty="0" smtClean="0">
+                <a:ln>
+                  <a:noFill/>
+                </a:ln>
+                <a:solidFill>
+                  <a:srgbClr val="24292E"/>
+                </a:solidFill>
+                <a:effectLst/>
+                <a:latin typeface="Consolas" panose="020B0609020204030204" pitchFamily="49" charset="0"/>
+              </a:rPr>
+              <a:t> </a:t>
+            </a:r>
+            <a:r>
+              <a:rPr kumimoji="0" lang="en-US" altLang="en-US" sz="1000" b="0" i="0" u="none" strike="noStrike" cap="none" normalizeH="0" baseline="0" dirty="0" smtClean="0">
+                <a:ln>
+                  <a:noFill/>
+                </a:ln>
+                <a:solidFill>
+                  <a:srgbClr val="6F42C1"/>
+                </a:solidFill>
+                <a:effectLst/>
+                <a:latin typeface="Consolas" panose="020B0609020204030204" pitchFamily="49" charset="0"/>
+              </a:rPr>
+              <a:t>Task</a:t>
+            </a:r>
+            <a:r>
+              <a:rPr kumimoji="0" lang="en-US" altLang="en-US" sz="1000" b="0" i="0" u="none" strike="noStrike" cap="none" normalizeH="0" baseline="0" dirty="0" smtClean="0">
+                <a:ln>
+                  <a:noFill/>
+                </a:ln>
+                <a:solidFill>
+                  <a:srgbClr val="24292E"/>
+                </a:solidFill>
+                <a:effectLst/>
+                <a:latin typeface="Consolas" panose="020B0609020204030204" pitchFamily="49" charset="0"/>
+              </a:rPr>
+              <a:t>&lt;</a:t>
+            </a:r>
+            <a:r>
+              <a:rPr kumimoji="0" lang="en-US" altLang="en-US" sz="1000" b="0" i="0" u="none" strike="noStrike" cap="none" normalizeH="0" baseline="0" dirty="0" smtClean="0">
+                <a:ln>
+                  <a:noFill/>
+                </a:ln>
+                <a:solidFill>
+                  <a:srgbClr val="D73A49"/>
+                </a:solidFill>
+                <a:effectLst/>
+                <a:latin typeface="Consolas" panose="020B0609020204030204" pitchFamily="49" charset="0"/>
+              </a:rPr>
+              <a:t>string</a:t>
+            </a:r>
+            <a:r>
+              <a:rPr kumimoji="0" lang="en-US" altLang="en-US" sz="1000" b="0" i="0" u="none" strike="noStrike" cap="none" normalizeH="0" baseline="0" dirty="0" smtClean="0">
+                <a:ln>
+                  <a:noFill/>
+                </a:ln>
+                <a:solidFill>
+                  <a:srgbClr val="24292E"/>
+                </a:solidFill>
+                <a:effectLst/>
+                <a:latin typeface="Consolas" panose="020B0609020204030204" pitchFamily="49" charset="0"/>
+              </a:rPr>
+              <a:t>&gt; </a:t>
+            </a:r>
+            <a:r>
+              <a:rPr kumimoji="0" lang="en-US" altLang="en-US" sz="1000" b="0" i="0" u="none" strike="noStrike" cap="none" normalizeH="0" baseline="0" dirty="0" smtClean="0">
+                <a:ln>
+                  <a:noFill/>
+                </a:ln>
+                <a:solidFill>
+                  <a:srgbClr val="6F42C1"/>
+                </a:solidFill>
+                <a:effectLst/>
+                <a:latin typeface="Consolas" panose="020B0609020204030204" pitchFamily="49" charset="0"/>
+              </a:rPr>
+              <a:t>Hello</a:t>
+            </a:r>
+            <a:r>
+              <a:rPr kumimoji="0" lang="en-US" altLang="en-US" sz="1000" b="0" i="0" u="none" strike="noStrike" cap="none" normalizeH="0" baseline="0" dirty="0" smtClean="0">
+                <a:ln>
+                  <a:noFill/>
+                </a:ln>
+                <a:solidFill>
+                  <a:srgbClr val="24292E"/>
+                </a:solidFill>
+                <a:effectLst/>
+                <a:latin typeface="Consolas" panose="020B0609020204030204" pitchFamily="49" charset="0"/>
+              </a:rPr>
+              <a:t>(</a:t>
+            </a:r>
+            <a:r>
+              <a:rPr kumimoji="0" lang="en-US" altLang="en-US" sz="1000" b="0" i="0" u="none" strike="noStrike" cap="none" normalizeH="0" baseline="0" dirty="0" smtClean="0">
+                <a:ln>
+                  <a:noFill/>
+                </a:ln>
+                <a:solidFill>
+                  <a:srgbClr val="D73A49"/>
+                </a:solidFill>
+                <a:effectLst/>
+                <a:latin typeface="Consolas" panose="020B0609020204030204" pitchFamily="49" charset="0"/>
+              </a:rPr>
+              <a:t>string</a:t>
+            </a:r>
+            <a:r>
+              <a:rPr kumimoji="0" lang="en-US" altLang="en-US" sz="1000" b="0" i="0" u="none" strike="noStrike" cap="none" normalizeH="0" baseline="0" dirty="0" smtClean="0">
+                <a:ln>
+                  <a:noFill/>
+                </a:ln>
+                <a:solidFill>
+                  <a:srgbClr val="24292E"/>
+                </a:solidFill>
+                <a:effectLst/>
+                <a:latin typeface="Consolas" panose="020B0609020204030204" pitchFamily="49" charset="0"/>
+              </a:rPr>
+              <a:t> name)</a:t>
+            </a:r>
+          </a:p>
+          <a:p>
+            <a:pPr marL="0" marR="0" lvl="0" indent="0" algn="l" defTabSz="914400" rtl="0" eaLnBrk="0" fontAlgn="base" latinLnBrk="0" hangingPunct="0">
+              <a:lnSpc>
+                <a:spcPct val="100000"/>
+              </a:lnSpc>
+              <a:spcBef>
+                <a:spcPct val="0"/>
+              </a:spcBef>
+              <a:spcAft>
+                <a:spcPct val="0"/>
+              </a:spcAft>
+              <a:buClrTx/>
+              <a:buSzTx/>
+              <a:buFontTx/>
+              <a:buNone/>
+              <a:tabLst/>
+            </a:pPr>
+            <a:r>
+              <a:rPr kumimoji="0" lang="en-US" altLang="en-US" sz="1000" b="0" i="0" u="none" strike="noStrike" cap="none" normalizeH="0" baseline="0" dirty="0" smtClean="0">
+                <a:ln>
+                  <a:noFill/>
+                </a:ln>
+                <a:solidFill>
+                  <a:srgbClr val="24292E"/>
+                </a:solidFill>
+                <a:effectLst/>
+                <a:latin typeface="Consolas" panose="020B0609020204030204" pitchFamily="49" charset="0"/>
+              </a:rPr>
+              <a:t>{</a:t>
+            </a:r>
+          </a:p>
+          <a:p>
+            <a:pPr marL="0" marR="0" lvl="0" indent="0" algn="l" defTabSz="914400" rtl="0" eaLnBrk="0" fontAlgn="base" latinLnBrk="0" hangingPunct="0">
+              <a:lnSpc>
+                <a:spcPct val="100000"/>
+              </a:lnSpc>
+              <a:spcBef>
+                <a:spcPct val="0"/>
+              </a:spcBef>
+              <a:spcAft>
+                <a:spcPct val="0"/>
+              </a:spcAft>
+              <a:buClrTx/>
+              <a:buSzTx/>
+              <a:buFontTx/>
+              <a:buNone/>
+              <a:tabLst/>
+            </a:pPr>
+            <a:r>
+              <a:rPr lang="en-US" altLang="en-US" sz="1000" dirty="0">
+                <a:solidFill>
+                  <a:srgbClr val="24292E"/>
+                </a:solidFill>
+                <a:latin typeface="Consolas" panose="020B0609020204030204" pitchFamily="49" charset="0"/>
+              </a:rPr>
+              <a:t> </a:t>
+            </a:r>
+            <a:r>
+              <a:rPr lang="en-US" altLang="en-US" sz="1000" dirty="0" smtClean="0">
+                <a:solidFill>
+                  <a:srgbClr val="24292E"/>
+                </a:solidFill>
+                <a:latin typeface="Consolas" panose="020B0609020204030204" pitchFamily="49" charset="0"/>
+              </a:rPr>
+              <a:t>   </a:t>
+            </a:r>
+            <a:r>
+              <a:rPr kumimoji="0" lang="en-US" altLang="en-US" sz="1000" b="0" i="0" u="none" strike="noStrike" cap="none" normalizeH="0" baseline="0" dirty="0" smtClean="0">
+                <a:ln>
+                  <a:noFill/>
+                </a:ln>
+                <a:solidFill>
+                  <a:srgbClr val="D73A49"/>
+                </a:solidFill>
+                <a:effectLst/>
+                <a:latin typeface="Consolas" panose="020B0609020204030204" pitchFamily="49" charset="0"/>
+              </a:rPr>
+              <a:t>return</a:t>
+            </a:r>
+            <a:r>
+              <a:rPr kumimoji="0" lang="en-US" altLang="en-US" sz="1000" b="0" i="0" u="none" strike="noStrike" cap="none" normalizeH="0" baseline="0" dirty="0" smtClean="0">
+                <a:ln>
+                  <a:noFill/>
+                </a:ln>
+                <a:solidFill>
+                  <a:srgbClr val="24292E"/>
+                </a:solidFill>
+                <a:effectLst/>
+                <a:latin typeface="Consolas" panose="020B0609020204030204" pitchFamily="49" charset="0"/>
+              </a:rPr>
+              <a:t> </a:t>
+            </a:r>
+            <a:r>
+              <a:rPr kumimoji="0" lang="en-US" altLang="en-US" sz="1000" b="0" i="0" u="none" strike="noStrike" cap="none" normalizeH="0" baseline="0" dirty="0" smtClean="0">
+                <a:ln>
+                  <a:noFill/>
+                </a:ln>
+                <a:solidFill>
+                  <a:srgbClr val="032F62"/>
+                </a:solidFill>
+                <a:effectLst/>
+                <a:latin typeface="Consolas" panose="020B0609020204030204" pitchFamily="49" charset="0"/>
+              </a:rPr>
+              <a:t>$"Hello world, from </a:t>
+            </a:r>
+            <a:r>
+              <a:rPr kumimoji="0" lang="en-US" altLang="en-US" sz="1000" b="0" i="0" u="none" strike="noStrike" cap="none" normalizeH="0" baseline="0" dirty="0" smtClean="0">
+                <a:ln>
+                  <a:noFill/>
+                </a:ln>
+                <a:solidFill>
+                  <a:srgbClr val="24292E"/>
+                </a:solidFill>
+                <a:effectLst/>
+                <a:latin typeface="Consolas" panose="020B0609020204030204" pitchFamily="49" charset="0"/>
+              </a:rPr>
+              <a:t>{name}</a:t>
+            </a:r>
+            <a:r>
+              <a:rPr kumimoji="0" lang="en-US" altLang="en-US" sz="1000" b="0" i="0" u="none" strike="noStrike" cap="none" normalizeH="0" baseline="0" dirty="0" smtClean="0">
+                <a:ln>
+                  <a:noFill/>
+                </a:ln>
+                <a:solidFill>
+                  <a:srgbClr val="032F62"/>
+                </a:solidFill>
+                <a:effectLst/>
+                <a:latin typeface="Consolas" panose="020B0609020204030204" pitchFamily="49" charset="0"/>
+              </a:rPr>
+              <a:t>!"</a:t>
+            </a:r>
+            <a:r>
+              <a:rPr kumimoji="0" lang="en-US" altLang="en-US" sz="1000" b="0" i="0" u="none" strike="noStrike" cap="none" normalizeH="0" baseline="0" dirty="0" smtClean="0">
+                <a:ln>
+                  <a:noFill/>
+                </a:ln>
+                <a:solidFill>
+                  <a:srgbClr val="24292E"/>
+                </a:solidFill>
+                <a:effectLst/>
+                <a:latin typeface="Consolas" panose="020B0609020204030204" pitchFamily="49" charset="0"/>
+              </a:rPr>
+              <a:t>; </a:t>
+            </a:r>
+          </a:p>
+          <a:p>
+            <a:pPr marL="0" marR="0" lvl="0" indent="0" algn="l" defTabSz="914400" rtl="0" eaLnBrk="0" fontAlgn="base" latinLnBrk="0" hangingPunct="0">
+              <a:lnSpc>
+                <a:spcPct val="100000"/>
+              </a:lnSpc>
+              <a:spcBef>
+                <a:spcPct val="0"/>
+              </a:spcBef>
+              <a:spcAft>
+                <a:spcPct val="0"/>
+              </a:spcAft>
+              <a:buClrTx/>
+              <a:buSzTx/>
+              <a:buFontTx/>
+              <a:buNone/>
+              <a:tabLst/>
+            </a:pPr>
+            <a:r>
+              <a:rPr kumimoji="0" lang="en-US" altLang="en-US" sz="1000" b="0" i="0" u="none" strike="noStrike" cap="none" normalizeH="0" baseline="0" dirty="0" smtClean="0">
+                <a:ln>
+                  <a:noFill/>
+                </a:ln>
+                <a:solidFill>
+                  <a:srgbClr val="24292E"/>
+                </a:solidFill>
+                <a:effectLst/>
+                <a:latin typeface="Consolas" panose="020B0609020204030204" pitchFamily="49" charset="0"/>
+              </a:rPr>
+              <a:t>}</a:t>
+            </a:r>
+            <a:r>
+              <a:rPr kumimoji="0" lang="en-US" altLang="en-US" sz="900" b="0" i="0" u="none" strike="noStrike" cap="none" normalizeH="0" baseline="0" dirty="0" smtClean="0">
+                <a:ln>
+                  <a:noFill/>
+                </a:ln>
+                <a:solidFill>
+                  <a:schemeClr val="tx1"/>
+                </a:solidFill>
+                <a:effectLst/>
+                <a:latin typeface="Consolas" panose="020B0609020204030204" pitchFamily="49" charset="0"/>
+              </a:rPr>
+              <a:t> </a:t>
+            </a:r>
+            <a:endParaRPr kumimoji="0" lang="en-US" altLang="en-US" sz="2000" b="0" i="0" u="none" strike="noStrike" cap="none" normalizeH="0" baseline="0" dirty="0" smtClean="0">
+              <a:ln>
+                <a:noFill/>
+              </a:ln>
+              <a:solidFill>
+                <a:schemeClr val="tx1"/>
+              </a:solidFill>
+              <a:effectLst/>
+              <a:latin typeface="Consolas" panose="020B0609020204030204" pitchFamily="49" charset="0"/>
+            </a:endParaRPr>
+          </a:p>
+        </p:txBody>
+      </p:sp>
+      <p:cxnSp>
+        <p:nvCxnSpPr>
+          <p:cNvPr id="26" name="Elbow Connector 25"/>
+          <p:cNvCxnSpPr>
+            <a:endCxn id="9" idx="1"/>
+          </p:cNvCxnSpPr>
+          <p:nvPr/>
+        </p:nvCxnSpPr>
+        <p:spPr>
+          <a:xfrm rot="5400000" flipH="1" flipV="1">
+            <a:off x="3004300" y="1022420"/>
+            <a:ext cx="1439922" cy="655835"/>
+          </a:xfrm>
+          <a:prstGeom prst="bentConnector2">
+            <a:avLst/>
+          </a:prstGeom>
+          <a:ln w="19050">
+            <a:solidFill>
+              <a:srgbClr val="C00000"/>
+            </a:solidFill>
+            <a:prstDash val="sysDash"/>
+            <a:tailEnd type="triangle" w="lg" len="lg"/>
+          </a:ln>
+        </p:spPr>
+        <p:style>
+          <a:lnRef idx="1">
+            <a:schemeClr val="accent1"/>
+          </a:lnRef>
+          <a:fillRef idx="0">
+            <a:schemeClr val="accent1"/>
+          </a:fillRef>
+          <a:effectRef idx="0">
+            <a:schemeClr val="accent1"/>
+          </a:effectRef>
+          <a:fontRef idx="minor">
+            <a:schemeClr val="tx1"/>
+          </a:fontRef>
+        </p:style>
+      </p:cxnSp>
+      <p:cxnSp>
+        <p:nvCxnSpPr>
+          <p:cNvPr id="117" name="Elbow Connector 116"/>
+          <p:cNvCxnSpPr>
+            <a:stCxn id="9" idx="2"/>
+            <a:endCxn id="114" idx="0"/>
+          </p:cNvCxnSpPr>
+          <p:nvPr/>
+        </p:nvCxnSpPr>
+        <p:spPr>
+          <a:xfrm rot="5400000">
+            <a:off x="5762561" y="1390995"/>
+            <a:ext cx="721020" cy="1"/>
+          </a:xfrm>
+          <a:prstGeom prst="bentConnector3">
+            <a:avLst>
+              <a:gd name="adj1" fmla="val 50000"/>
+            </a:avLst>
+          </a:prstGeom>
+          <a:ln w="19050">
+            <a:solidFill>
+              <a:srgbClr val="C00000"/>
+            </a:solidFill>
+            <a:prstDash val="sysDash"/>
+            <a:tailEnd type="triangle" w="lg" len="lg"/>
+          </a:ln>
+        </p:spPr>
+        <p:style>
+          <a:lnRef idx="1">
+            <a:schemeClr val="accent1"/>
+          </a:lnRef>
+          <a:fillRef idx="0">
+            <a:schemeClr val="accent1"/>
+          </a:fillRef>
+          <a:effectRef idx="0">
+            <a:schemeClr val="accent1"/>
+          </a:effectRef>
+          <a:fontRef idx="minor">
+            <a:schemeClr val="tx1"/>
+          </a:fontRef>
+        </p:style>
+      </p:cxnSp>
+      <p:cxnSp>
+        <p:nvCxnSpPr>
+          <p:cNvPr id="120" name="Elbow Connector 119"/>
+          <p:cNvCxnSpPr>
+            <a:stCxn id="114" idx="3"/>
+            <a:endCxn id="10" idx="0"/>
+          </p:cNvCxnSpPr>
+          <p:nvPr/>
+        </p:nvCxnSpPr>
+        <p:spPr>
+          <a:xfrm rot="16200000" flipH="1">
+            <a:off x="5711263" y="3336889"/>
+            <a:ext cx="823615" cy="1"/>
+          </a:xfrm>
+          <a:prstGeom prst="bentConnector3">
+            <a:avLst>
+              <a:gd name="adj1" fmla="val 50000"/>
+            </a:avLst>
+          </a:prstGeom>
+          <a:ln w="19050">
+            <a:solidFill>
+              <a:srgbClr val="C00000"/>
+            </a:solidFill>
+            <a:prstDash val="sysDash"/>
+            <a:tailEnd type="triangle" w="lg" len="lg"/>
+          </a:ln>
+        </p:spPr>
+        <p:style>
+          <a:lnRef idx="1">
+            <a:schemeClr val="accent1"/>
+          </a:lnRef>
+          <a:fillRef idx="0">
+            <a:schemeClr val="accent1"/>
+          </a:fillRef>
+          <a:effectRef idx="0">
+            <a:schemeClr val="accent1"/>
+          </a:effectRef>
+          <a:fontRef idx="minor">
+            <a:schemeClr val="tx1"/>
+          </a:fontRef>
+        </p:style>
+      </p:cxnSp>
+      <p:cxnSp>
+        <p:nvCxnSpPr>
+          <p:cNvPr id="125" name="Elbow Connector 124"/>
+          <p:cNvCxnSpPr>
+            <a:stCxn id="10" idx="1"/>
+          </p:cNvCxnSpPr>
+          <p:nvPr/>
+        </p:nvCxnSpPr>
+        <p:spPr>
+          <a:xfrm rot="10800000">
+            <a:off x="3396343" y="3107094"/>
+            <a:ext cx="655836" cy="1118658"/>
+          </a:xfrm>
+          <a:prstGeom prst="bentConnector2">
+            <a:avLst/>
+          </a:prstGeom>
+          <a:ln w="19050">
+            <a:solidFill>
+              <a:srgbClr val="C00000"/>
+            </a:solidFill>
+            <a:prstDash val="sysDash"/>
+            <a:tailEnd type="triangle" w="lg" len="lg"/>
+          </a:ln>
+        </p:spPr>
+        <p:style>
+          <a:lnRef idx="1">
+            <a:schemeClr val="accent1"/>
+          </a:lnRef>
+          <a:fillRef idx="0">
+            <a:schemeClr val="accent1"/>
+          </a:fillRef>
+          <a:effectRef idx="0">
+            <a:schemeClr val="accent1"/>
+          </a:effectRef>
+          <a:fontRef idx="minor">
+            <a:schemeClr val="tx1"/>
+          </a:fontRef>
+        </p:style>
+      </p:cxnSp>
+      <p:cxnSp>
+        <p:nvCxnSpPr>
+          <p:cNvPr id="129" name="Elbow Connector 128"/>
+          <p:cNvCxnSpPr>
+            <a:endCxn id="13" idx="1"/>
+          </p:cNvCxnSpPr>
+          <p:nvPr/>
+        </p:nvCxnSpPr>
+        <p:spPr>
+          <a:xfrm>
+            <a:off x="6123068" y="2464230"/>
+            <a:ext cx="970920" cy="1"/>
+          </a:xfrm>
+          <a:prstGeom prst="bentConnector3">
+            <a:avLst>
+              <a:gd name="adj1" fmla="val 50000"/>
+            </a:avLst>
+          </a:prstGeom>
+          <a:ln w="19050">
+            <a:solidFill>
+              <a:srgbClr val="C00000"/>
+            </a:solidFill>
+            <a:prstDash val="sysDash"/>
+            <a:headEnd type="oval" w="med" len="med"/>
+            <a:tailEnd type="oval" w="lg" len="lg"/>
+          </a:ln>
+        </p:spPr>
+        <p:style>
+          <a:lnRef idx="1">
+            <a:schemeClr val="accent1"/>
+          </a:lnRef>
+          <a:fillRef idx="0">
+            <a:schemeClr val="accent1"/>
+          </a:fillRef>
+          <a:effectRef idx="0">
+            <a:schemeClr val="accent1"/>
+          </a:effectRef>
+          <a:fontRef idx="minor">
+            <a:schemeClr val="tx1"/>
+          </a:fontRef>
+        </p:style>
+      </p:cxnSp>
+    </p:spTree>
+    <p:extLst>
+      <p:ext uri="{BB962C8B-B14F-4D97-AF65-F5344CB8AC3E}">
+        <p14:creationId xmlns:p14="http://schemas.microsoft.com/office/powerpoint/2010/main" val="3570073285"/>
+      </p:ext>
+    </p:extLst>
+  </p:cSld>
+  <p:clrMapOvr>
+    <a:masterClrMapping/>
+  </p:clrMapOvr>
+  <p:timing>
+    <p:tnLst>
+      <p:par>
+        <p:cTn id="1" dur="indefinite" restart="never" nodeType="tmRoot"/>
+      </p:par>
+    </p:tnLst>
+  </p:timing>
+</p:sld>
+</file>
+
 <file path=ppt/theme/theme1.xml><?xml version="1.0" encoding="utf-8"?>
 <a:theme xmlns:a="http://schemas.openxmlformats.org/drawingml/2006/main" name="Office Theme">
   <a:themeElements>

</xml_diff>

<commit_message>
Docs: adding data flow figure for 1st happy path demo (improved)
</commit_message>
<xml_diff>
--- a/Docs/Concept.pptx
+++ b/Docs/Concept.pptx
@@ -7940,15 +7940,21 @@
           <p:nvPr/>
         </p:nvPicPr>
         <p:blipFill>
-          <a:blip r:embed="rId2"/>
+          <a:blip r:embed="rId2">
+            <a:extLst>
+              <a:ext uri="{28A0092B-C50C-407E-A947-70E740481C1C}">
+                <a14:useLocalDpi xmlns:a14="http://schemas.microsoft.com/office/drawing/2010/main" val="0"/>
+              </a:ext>
+            </a:extLst>
+          </a:blip>
           <a:stretch>
             <a:fillRect/>
           </a:stretch>
         </p:blipFill>
         <p:spPr>
           <a:xfrm>
-            <a:off x="483019" y="1404051"/>
-            <a:ext cx="4669132" cy="1870994"/>
+            <a:off x="1784173" y="1815874"/>
+            <a:ext cx="3367724" cy="1344401"/>
           </a:xfrm>
           <a:prstGeom prst="rect">
             <a:avLst/>
@@ -7978,7 +7984,7 @@
         </p:nvSpPr>
         <p:spPr bwMode="auto">
           <a:xfrm>
-            <a:off x="4052179" y="230266"/>
+            <a:off x="3854467" y="230266"/>
             <a:ext cx="4141783" cy="800219"/>
           </a:xfrm>
           <a:prstGeom prst="rect">
@@ -8188,21 +8194,13 @@
             </a:endParaRPr>
           </a:p>
           <a:p>
-            <a:pPr marL="0" marR="0" lvl="0" indent="0" algn="l" defTabSz="914400" rtl="0" eaLnBrk="0" fontAlgn="base" latinLnBrk="0" hangingPunct="0">
-              <a:lnSpc>
-                <a:spcPct val="100000"/>
-              </a:lnSpc>
+            <a:pPr lvl="0" eaLnBrk="0" fontAlgn="base" hangingPunct="0">
               <a:spcBef>
                 <a:spcPct val="0"/>
               </a:spcBef>
               <a:spcAft>
                 <a:spcPct val="0"/>
               </a:spcAft>
-              <a:buClrTx/>
-              <a:buSzTx/>
-              <a:buFontTx/>
-              <a:buNone/>
-              <a:tabLst/>
             </a:pPr>
             <a:r>
               <a:rPr kumimoji="0" lang="en-US" altLang="en-US" sz="1000" b="0" i="0" u="none" strike="noStrike" cap="none" normalizeH="0" baseline="0" dirty="0" smtClean="0">
@@ -8244,17 +8242,13 @@
               <a:t>: </a:t>
             </a:r>
             <a:r>
-              <a:rPr kumimoji="0" lang="en-US" altLang="en-US" sz="1000" b="0" i="0" u="none" strike="noStrike" cap="none" normalizeH="0" baseline="0" dirty="0" smtClean="0">
-                <a:ln>
-                  <a:noFill/>
-                </a:ln>
+              <a:rPr lang="en-US" altLang="en-US" sz="1000" dirty="0">
                 <a:solidFill>
                   <a:srgbClr val="032F62"/>
                 </a:solidFill>
-                <a:effectLst/>
                 <a:latin typeface="Consolas" panose="020B0609020204030204" pitchFamily="49" charset="0"/>
               </a:rPr>
-              <a:t>“</a:t>
+              <a:t>"</a:t>
             </a:r>
             <a:r>
               <a:rPr lang="en-US" altLang="en-US" sz="1000" dirty="0" err="1" smtClean="0">
@@ -8340,7 +8334,7 @@
         </p:nvSpPr>
         <p:spPr bwMode="auto">
           <a:xfrm>
-            <a:off x="4052179" y="3748698"/>
+            <a:off x="3854467" y="3748698"/>
             <a:ext cx="4141783" cy="954107"/>
           </a:xfrm>
           <a:prstGeom prst="rect">
@@ -8774,7 +8768,7 @@
         </p:nvGrpSpPr>
         <p:grpSpPr>
           <a:xfrm>
-            <a:off x="5519293" y="1751505"/>
+            <a:off x="5321581" y="1751505"/>
             <a:ext cx="1207551" cy="1173578"/>
             <a:chOff x="10896863" y="2204270"/>
             <a:chExt cx="1019884" cy="1061444"/>
@@ -8926,7 +8920,7 @@
         </p:nvSpPr>
         <p:spPr bwMode="auto">
           <a:xfrm>
-            <a:off x="7093988" y="2064121"/>
+            <a:off x="6698564" y="2062465"/>
             <a:ext cx="3346968" cy="800219"/>
           </a:xfrm>
           <a:prstGeom prst="rect">
@@ -9343,8 +9337,8 @@
         </p:nvCxnSpPr>
         <p:spPr>
           <a:xfrm rot="5400000" flipH="1" flipV="1">
-            <a:off x="3004300" y="1022420"/>
-            <a:ext cx="1439922" cy="655835"/>
+            <a:off x="2806406" y="1226200"/>
+            <a:ext cx="1643884" cy="452237"/>
           </a:xfrm>
           <a:prstGeom prst="bentConnector2">
             <a:avLst/>
@@ -9383,7 +9377,7 @@
         </p:nvCxnSpPr>
         <p:spPr>
           <a:xfrm rot="5400000">
-            <a:off x="5762561" y="1390995"/>
+            <a:off x="5564849" y="1390995"/>
             <a:ext cx="721020" cy="1"/>
           </a:xfrm>
           <a:prstGeom prst="bentConnector3">
@@ -9425,7 +9419,7 @@
         </p:nvCxnSpPr>
         <p:spPr>
           <a:xfrm rot="16200000" flipH="1">
-            <a:off x="5711263" y="3336889"/>
+            <a:off x="5513551" y="3336889"/>
             <a:ext cx="823615" cy="1"/>
           </a:xfrm>
           <a:prstGeom prst="bentConnector3">
@@ -9466,8 +9460,8 @@
         </p:nvCxnSpPr>
         <p:spPr>
           <a:xfrm rot="10800000">
-            <a:off x="3396343" y="3107094"/>
-            <a:ext cx="655836" cy="1118658"/>
+            <a:off x="3402229" y="2925082"/>
+            <a:ext cx="452238" cy="1300671"/>
           </a:xfrm>
           <a:prstGeom prst="bentConnector2">
             <a:avLst/>
@@ -9498,15 +9492,13 @@
       <p:cxnSp>
         <p:nvCxnSpPr>
           <p:cNvPr id="129" name="Elbow Connector 128"/>
-          <p:cNvCxnSpPr>
-            <a:endCxn id="13" idx="1"/>
-          </p:cNvCxnSpPr>
+          <p:cNvCxnSpPr/>
           <p:nvPr/>
         </p:nvCxnSpPr>
         <p:spPr>
           <a:xfrm>
-            <a:off x="6123068" y="2464230"/>
-            <a:ext cx="970920" cy="1"/>
+            <a:off x="5931243" y="2504305"/>
+            <a:ext cx="767321" cy="618"/>
           </a:xfrm>
           <a:prstGeom prst="bentConnector3">
             <a:avLst>

</xml_diff>

<commit_message>
Docs: update data flow figure for 1st happy path demo
</commit_message>
<xml_diff>
--- a/Docs/Concept.pptx
+++ b/Docs/Concept.pptx
@@ -244,7 +244,7 @@
           <a:p>
             <a:fld id="{A138F55C-582E-4B71-904C-0AE799693AB9}" type="datetimeFigureOut">
               <a:rPr lang="en-US" smtClean="0"/>
-              <a:t>8/5/2017</a:t>
+              <a:t>8/6/2017</a:t>
             </a:fld>
             <a:endParaRPr lang="en-US"/>
           </a:p>
@@ -414,7 +414,7 @@
           <a:p>
             <a:fld id="{A138F55C-582E-4B71-904C-0AE799693AB9}" type="datetimeFigureOut">
               <a:rPr lang="en-US" smtClean="0"/>
-              <a:t>8/5/2017</a:t>
+              <a:t>8/6/2017</a:t>
             </a:fld>
             <a:endParaRPr lang="en-US"/>
           </a:p>
@@ -594,7 +594,7 @@
           <a:p>
             <a:fld id="{A138F55C-582E-4B71-904C-0AE799693AB9}" type="datetimeFigureOut">
               <a:rPr lang="en-US" smtClean="0"/>
-              <a:t>8/5/2017</a:t>
+              <a:t>8/6/2017</a:t>
             </a:fld>
             <a:endParaRPr lang="en-US"/>
           </a:p>
@@ -764,7 +764,7 @@
           <a:p>
             <a:fld id="{A138F55C-582E-4B71-904C-0AE799693AB9}" type="datetimeFigureOut">
               <a:rPr lang="en-US" smtClean="0"/>
-              <a:t>8/5/2017</a:t>
+              <a:t>8/6/2017</a:t>
             </a:fld>
             <a:endParaRPr lang="en-US"/>
           </a:p>
@@ -1010,7 +1010,7 @@
           <a:p>
             <a:fld id="{A138F55C-582E-4B71-904C-0AE799693AB9}" type="datetimeFigureOut">
               <a:rPr lang="en-US" smtClean="0"/>
-              <a:t>8/5/2017</a:t>
+              <a:t>8/6/2017</a:t>
             </a:fld>
             <a:endParaRPr lang="en-US"/>
           </a:p>
@@ -1242,7 +1242,7 @@
           <a:p>
             <a:fld id="{A138F55C-582E-4B71-904C-0AE799693AB9}" type="datetimeFigureOut">
               <a:rPr lang="en-US" smtClean="0"/>
-              <a:t>8/5/2017</a:t>
+              <a:t>8/6/2017</a:t>
             </a:fld>
             <a:endParaRPr lang="en-US"/>
           </a:p>
@@ -1609,7 +1609,7 @@
           <a:p>
             <a:fld id="{A138F55C-582E-4B71-904C-0AE799693AB9}" type="datetimeFigureOut">
               <a:rPr lang="en-US" smtClean="0"/>
-              <a:t>8/5/2017</a:t>
+              <a:t>8/6/2017</a:t>
             </a:fld>
             <a:endParaRPr lang="en-US"/>
           </a:p>
@@ -1727,7 +1727,7 @@
           <a:p>
             <a:fld id="{A138F55C-582E-4B71-904C-0AE799693AB9}" type="datetimeFigureOut">
               <a:rPr lang="en-US" smtClean="0"/>
-              <a:t>8/5/2017</a:t>
+              <a:t>8/6/2017</a:t>
             </a:fld>
             <a:endParaRPr lang="en-US"/>
           </a:p>
@@ -1822,7 +1822,7 @@
           <a:p>
             <a:fld id="{A138F55C-582E-4B71-904C-0AE799693AB9}" type="datetimeFigureOut">
               <a:rPr lang="en-US" smtClean="0"/>
-              <a:t>8/5/2017</a:t>
+              <a:t>8/6/2017</a:t>
             </a:fld>
             <a:endParaRPr lang="en-US"/>
           </a:p>
@@ -2099,7 +2099,7 @@
           <a:p>
             <a:fld id="{A138F55C-582E-4B71-904C-0AE799693AB9}" type="datetimeFigureOut">
               <a:rPr lang="en-US" smtClean="0"/>
-              <a:t>8/5/2017</a:t>
+              <a:t>8/6/2017</a:t>
             </a:fld>
             <a:endParaRPr lang="en-US"/>
           </a:p>
@@ -2352,7 +2352,7 @@
           <a:p>
             <a:fld id="{A138F55C-582E-4B71-904C-0AE799693AB9}" type="datetimeFigureOut">
               <a:rPr lang="en-US" smtClean="0"/>
-              <a:t>8/5/2017</a:t>
+              <a:t>8/6/2017</a:t>
             </a:fld>
             <a:endParaRPr lang="en-US"/>
           </a:p>
@@ -2565,7 +2565,7 @@
           <a:p>
             <a:fld id="{A138F55C-582E-4B71-904C-0AE799693AB9}" type="datetimeFigureOut">
               <a:rPr lang="en-US" smtClean="0"/>
-              <a:t>8/5/2017</a:t>
+              <a:t>8/6/2017</a:t>
             </a:fld>
             <a:endParaRPr lang="en-US"/>
           </a:p>
@@ -7953,7 +7953,7 @@
         </p:blipFill>
         <p:spPr>
           <a:xfrm>
-            <a:off x="1784173" y="1815874"/>
+            <a:off x="7996250" y="5432059"/>
             <a:ext cx="3367724" cy="1344401"/>
           </a:xfrm>
           <a:prstGeom prst="rect">
@@ -8879,7 +8879,7 @@
           <p:spPr>
             <a:xfrm>
               <a:off x="10896863" y="2566435"/>
-              <a:ext cx="1019884" cy="176651"/>
+              <a:ext cx="1019884" cy="159772"/>
             </a:xfrm>
             <a:prstGeom prst="rect">
               <a:avLst/>
@@ -8898,7 +8898,7 @@
                 </a:lnSpc>
               </a:pPr>
               <a:r>
-                <a:rPr lang="en-US" sz="1400" spc="-50" dirty="0" err="1" smtClean="0">
+                <a:rPr lang="en-US" sz="1400" dirty="0" err="1" smtClean="0">
                   <a:solidFill>
                     <a:srgbClr val="0070C0"/>
                   </a:solidFill>
@@ -9327,45 +9327,6 @@
           </a:p>
         </p:txBody>
       </p:sp>
-      <p:cxnSp>
-        <p:nvCxnSpPr>
-          <p:cNvPr id="26" name="Elbow Connector 25"/>
-          <p:cNvCxnSpPr>
-            <a:endCxn id="9" idx="1"/>
-          </p:cNvCxnSpPr>
-          <p:nvPr/>
-        </p:nvCxnSpPr>
-        <p:spPr>
-          <a:xfrm rot="5400000" flipH="1" flipV="1">
-            <a:off x="2806406" y="1226200"/>
-            <a:ext cx="1643884" cy="452237"/>
-          </a:xfrm>
-          <a:prstGeom prst="bentConnector2">
-            <a:avLst/>
-          </a:prstGeom>
-          <a:ln w="19050">
-            <a:solidFill>
-              <a:srgbClr val="C00000"/>
-            </a:solidFill>
-            <a:prstDash val="sysDash"/>
-            <a:tailEnd type="triangle" w="lg" len="lg"/>
-          </a:ln>
-        </p:spPr>
-        <p:style>
-          <a:lnRef idx="1">
-            <a:schemeClr val="accent1"/>
-          </a:lnRef>
-          <a:fillRef idx="0">
-            <a:schemeClr val="accent1"/>
-          </a:fillRef>
-          <a:effectRef idx="0">
-            <a:schemeClr val="accent1"/>
-          </a:effectRef>
-          <a:fontRef idx="minor">
-            <a:schemeClr val="tx1"/>
-          </a:fontRef>
-        </p:style>
-      </p:cxnSp>
       <p:cxnSp>
         <p:nvCxnSpPr>
           <p:cNvPr id="117" name="Elbow Connector 116"/>
@@ -9452,16 +9413,405 @@
       </p:cxnSp>
       <p:cxnSp>
         <p:nvCxnSpPr>
-          <p:cNvPr id="125" name="Elbow Connector 124"/>
-          <p:cNvCxnSpPr>
-            <a:stCxn id="10" idx="1"/>
-          </p:cNvCxnSpPr>
+          <p:cNvPr id="129" name="Elbow Connector 128"/>
+          <p:cNvCxnSpPr/>
           <p:nvPr/>
         </p:nvCxnSpPr>
         <p:spPr>
-          <a:xfrm rot="10800000">
-            <a:off x="3402229" y="2925082"/>
-            <a:ext cx="452238" cy="1300671"/>
+          <a:xfrm>
+            <a:off x="5931243" y="2504305"/>
+            <a:ext cx="767321" cy="618"/>
+          </a:xfrm>
+          <a:prstGeom prst="bentConnector3">
+            <a:avLst>
+              <a:gd name="adj1" fmla="val 50000"/>
+            </a:avLst>
+          </a:prstGeom>
+          <a:ln w="19050">
+            <a:solidFill>
+              <a:srgbClr val="C00000"/>
+            </a:solidFill>
+            <a:prstDash val="sysDash"/>
+            <a:headEnd type="oval" w="med" len="med"/>
+            <a:tailEnd type="oval" w="lg" len="lg"/>
+          </a:ln>
+        </p:spPr>
+        <p:style>
+          <a:lnRef idx="1">
+            <a:schemeClr val="accent1"/>
+          </a:lnRef>
+          <a:fillRef idx="0">
+            <a:schemeClr val="accent1"/>
+          </a:fillRef>
+          <a:effectRef idx="0">
+            <a:schemeClr val="accent1"/>
+          </a:effectRef>
+          <a:fontRef idx="minor">
+            <a:schemeClr val="tx1"/>
+          </a:fontRef>
+        </p:style>
+      </p:cxnSp>
+      <p:grpSp>
+        <p:nvGrpSpPr>
+          <p:cNvPr id="16" name="Group 15"/>
+          <p:cNvGrpSpPr/>
+          <p:nvPr/>
+        </p:nvGrpSpPr>
+        <p:grpSpPr>
+          <a:xfrm>
+            <a:off x="1881728" y="1588943"/>
+            <a:ext cx="3270421" cy="1601296"/>
+            <a:chOff x="980302" y="1751504"/>
+            <a:chExt cx="3270421" cy="1601296"/>
+          </a:xfrm>
+        </p:grpSpPr>
+        <p:sp>
+          <p:nvSpPr>
+            <p:cNvPr id="2" name="Rectangle 1"/>
+            <p:cNvSpPr/>
+            <p:nvPr/>
+          </p:nvSpPr>
+          <p:spPr>
+            <a:xfrm>
+              <a:off x="980302" y="1751504"/>
+              <a:ext cx="3270421" cy="1601296"/>
+            </a:xfrm>
+            <a:prstGeom prst="rect">
+              <a:avLst/>
+            </a:prstGeom>
+            <a:solidFill>
+              <a:schemeClr val="bg1"/>
+            </a:solidFill>
+            <a:ln w="9525">
+              <a:solidFill>
+                <a:schemeClr val="tx1"/>
+              </a:solidFill>
+              <a:prstDash val="dash"/>
+            </a:ln>
+            <a:effectLst>
+              <a:outerShdw blurRad="50800" dist="38100" dir="2700000" algn="tl" rotWithShape="0">
+                <a:prstClr val="black">
+                  <a:alpha val="40000"/>
+                </a:prstClr>
+              </a:outerShdw>
+            </a:effectLst>
+          </p:spPr>
+          <p:style>
+            <a:lnRef idx="2">
+              <a:schemeClr val="accent1">
+                <a:shade val="50000"/>
+              </a:schemeClr>
+            </a:lnRef>
+            <a:fillRef idx="1">
+              <a:schemeClr val="accent1"/>
+            </a:fillRef>
+            <a:effectRef idx="0">
+              <a:schemeClr val="accent1"/>
+            </a:effectRef>
+            <a:fontRef idx="minor">
+              <a:schemeClr val="lt1"/>
+            </a:fontRef>
+          </p:style>
+          <p:txBody>
+            <a:bodyPr rtlCol="0" anchor="t"/>
+            <a:lstStyle/>
+            <a:p>
+              <a:r>
+                <a:rPr lang="en-US" dirty="0" smtClean="0">
+                  <a:solidFill>
+                    <a:schemeClr val="tx1"/>
+                  </a:solidFill>
+                </a:rPr>
+                <a:t>Hello World App</a:t>
+              </a:r>
+              <a:endParaRPr lang="en-US" dirty="0">
+                <a:solidFill>
+                  <a:schemeClr val="tx1"/>
+                </a:solidFill>
+              </a:endParaRPr>
+            </a:p>
+          </p:txBody>
+        </p:sp>
+        <p:cxnSp>
+          <p:nvCxnSpPr>
+            <p:cNvPr id="4" name="Straight Connector 3"/>
+            <p:cNvCxnSpPr/>
+            <p:nvPr/>
+          </p:nvCxnSpPr>
+          <p:spPr>
+            <a:xfrm>
+              <a:off x="1087395" y="2209596"/>
+              <a:ext cx="3031524" cy="0"/>
+            </a:xfrm>
+            <a:prstGeom prst="line">
+              <a:avLst/>
+            </a:prstGeom>
+            <a:ln>
+              <a:solidFill>
+                <a:schemeClr val="tx1"/>
+              </a:solidFill>
+            </a:ln>
+          </p:spPr>
+          <p:style>
+            <a:lnRef idx="1">
+              <a:schemeClr val="accent1"/>
+            </a:lnRef>
+            <a:fillRef idx="0">
+              <a:schemeClr val="accent1"/>
+            </a:fillRef>
+            <a:effectRef idx="0">
+              <a:schemeClr val="accent1"/>
+            </a:effectRef>
+            <a:fontRef idx="minor">
+              <a:schemeClr val="tx1"/>
+            </a:fontRef>
+          </p:style>
+        </p:cxnSp>
+        <p:sp>
+          <p:nvSpPr>
+            <p:cNvPr id="5" name="TextBox 4"/>
+            <p:cNvSpPr txBox="1"/>
+            <p:nvPr/>
+          </p:nvSpPr>
+          <p:spPr>
+            <a:xfrm>
+              <a:off x="1087395" y="2358029"/>
+              <a:ext cx="526106" cy="261610"/>
+            </a:xfrm>
+            <a:prstGeom prst="rect">
+              <a:avLst/>
+            </a:prstGeom>
+            <a:noFill/>
+          </p:spPr>
+          <p:txBody>
+            <a:bodyPr wrap="none" rtlCol="0">
+              <a:spAutoFit/>
+            </a:bodyPr>
+            <a:lstStyle/>
+            <a:p>
+              <a:r>
+                <a:rPr lang="en-US" sz="1100" dirty="0" smtClean="0"/>
+                <a:t>Name</a:t>
+              </a:r>
+              <a:endParaRPr lang="en-US" sz="1100" dirty="0"/>
+            </a:p>
+          </p:txBody>
+        </p:sp>
+        <p:sp>
+          <p:nvSpPr>
+            <p:cNvPr id="18" name="TextBox 17"/>
+            <p:cNvSpPr txBox="1"/>
+            <p:nvPr/>
+          </p:nvSpPr>
+          <p:spPr>
+            <a:xfrm>
+              <a:off x="1087395" y="2678947"/>
+              <a:ext cx="636713" cy="261610"/>
+            </a:xfrm>
+            <a:prstGeom prst="rect">
+              <a:avLst/>
+            </a:prstGeom>
+            <a:noFill/>
+          </p:spPr>
+          <p:txBody>
+            <a:bodyPr wrap="none" rtlCol="0">
+              <a:spAutoFit/>
+            </a:bodyPr>
+            <a:lstStyle/>
+            <a:p>
+              <a:r>
+                <a:rPr lang="en-US" sz="1100" dirty="0" smtClean="0"/>
+                <a:t>We say:</a:t>
+              </a:r>
+              <a:endParaRPr lang="en-US" sz="1100" dirty="0"/>
+            </a:p>
+          </p:txBody>
+        </p:sp>
+        <p:sp>
+          <p:nvSpPr>
+            <p:cNvPr id="6" name="Rectangle 5"/>
+            <p:cNvSpPr/>
+            <p:nvPr/>
+          </p:nvSpPr>
+          <p:spPr>
+            <a:xfrm>
+              <a:off x="1837915" y="2378786"/>
+              <a:ext cx="1689337" cy="220096"/>
+            </a:xfrm>
+            <a:prstGeom prst="rect">
+              <a:avLst/>
+            </a:prstGeom>
+            <a:solidFill>
+              <a:schemeClr val="bg1"/>
+            </a:solidFill>
+            <a:ln w="3175">
+              <a:solidFill>
+                <a:schemeClr val="bg1">
+                  <a:lumMod val="65000"/>
+                </a:schemeClr>
+              </a:solidFill>
+            </a:ln>
+          </p:spPr>
+          <p:style>
+            <a:lnRef idx="2">
+              <a:schemeClr val="accent1">
+                <a:shade val="50000"/>
+              </a:schemeClr>
+            </a:lnRef>
+            <a:fillRef idx="1">
+              <a:schemeClr val="accent1"/>
+            </a:fillRef>
+            <a:effectRef idx="0">
+              <a:schemeClr val="accent1"/>
+            </a:effectRef>
+            <a:fontRef idx="minor">
+              <a:schemeClr val="lt1"/>
+            </a:fontRef>
+          </p:style>
+          <p:txBody>
+            <a:bodyPr rtlCol="0" anchor="ctr"/>
+            <a:lstStyle/>
+            <a:p>
+              <a:r>
+                <a:rPr lang="en-US" sz="1050" b="1" dirty="0" err="1" smtClean="0">
+                  <a:solidFill>
+                    <a:schemeClr val="tx1"/>
+                  </a:solidFill>
+                </a:rPr>
+                <a:t>nwheels</a:t>
+              </a:r>
+              <a:endParaRPr lang="en-US" sz="1050" b="1" dirty="0">
+                <a:solidFill>
+                  <a:schemeClr val="tx1"/>
+                </a:solidFill>
+              </a:endParaRPr>
+            </a:p>
+          </p:txBody>
+        </p:sp>
+        <p:sp>
+          <p:nvSpPr>
+            <p:cNvPr id="20" name="TextBox 19"/>
+            <p:cNvSpPr txBox="1"/>
+            <p:nvPr/>
+          </p:nvSpPr>
+          <p:spPr>
+            <a:xfrm>
+              <a:off x="1760498" y="2678947"/>
+              <a:ext cx="1786066" cy="261610"/>
+            </a:xfrm>
+            <a:prstGeom prst="rect">
+              <a:avLst/>
+            </a:prstGeom>
+            <a:noFill/>
+          </p:spPr>
+          <p:txBody>
+            <a:bodyPr wrap="none" rtlCol="0">
+              <a:spAutoFit/>
+            </a:bodyPr>
+            <a:lstStyle/>
+            <a:p>
+              <a:r>
+                <a:rPr lang="en-US" sz="1100" b="1" dirty="0" smtClean="0"/>
+                <a:t>Hello world, from </a:t>
+              </a:r>
+              <a:r>
+                <a:rPr lang="en-US" sz="1100" b="1" dirty="0" err="1" smtClean="0"/>
+                <a:t>nwheels</a:t>
+              </a:r>
+              <a:r>
+                <a:rPr lang="en-US" sz="1100" b="1" dirty="0" smtClean="0"/>
+                <a:t>!</a:t>
+              </a:r>
+              <a:endParaRPr lang="en-US" sz="1100" b="1" dirty="0"/>
+            </a:p>
+          </p:txBody>
+        </p:sp>
+        <p:sp>
+          <p:nvSpPr>
+            <p:cNvPr id="14" name="Rounded Rectangle 13"/>
+            <p:cNvSpPr/>
+            <p:nvPr/>
+          </p:nvSpPr>
+          <p:spPr>
+            <a:xfrm>
+              <a:off x="3591697" y="2390593"/>
+              <a:ext cx="527222" cy="210100"/>
+            </a:xfrm>
+            <a:prstGeom prst="roundRect">
+              <a:avLst/>
+            </a:prstGeom>
+            <a:solidFill>
+              <a:schemeClr val="bg1">
+                <a:lumMod val="95000"/>
+              </a:schemeClr>
+            </a:solidFill>
+            <a:ln>
+              <a:solidFill>
+                <a:schemeClr val="bg1">
+                  <a:lumMod val="75000"/>
+                </a:schemeClr>
+              </a:solidFill>
+            </a:ln>
+            <a:effectLst>
+              <a:glow rad="63500">
+                <a:schemeClr val="accent3">
+                  <a:satMod val="175000"/>
+                  <a:alpha val="40000"/>
+                </a:schemeClr>
+              </a:glow>
+            </a:effectLst>
+          </p:spPr>
+          <p:style>
+            <a:lnRef idx="2">
+              <a:schemeClr val="accent1">
+                <a:shade val="50000"/>
+              </a:schemeClr>
+            </a:lnRef>
+            <a:fillRef idx="1">
+              <a:schemeClr val="accent1"/>
+            </a:fillRef>
+            <a:effectRef idx="0">
+              <a:schemeClr val="accent1"/>
+            </a:effectRef>
+            <a:fontRef idx="minor">
+              <a:schemeClr val="lt1"/>
+            </a:fontRef>
+          </p:style>
+          <p:txBody>
+            <a:bodyPr rtlCol="0" anchor="ctr"/>
+            <a:lstStyle/>
+            <a:p>
+              <a:pPr algn="ctr"/>
+              <a:r>
+                <a:rPr lang="en-US" sz="1100" dirty="0" smtClean="0">
+                  <a:solidFill>
+                    <a:schemeClr val="tx1"/>
+                  </a:solidFill>
+                </a:rPr>
+                <a:t>Go</a:t>
+              </a:r>
+              <a:endParaRPr lang="en-US" sz="1100" dirty="0">
+                <a:solidFill>
+                  <a:schemeClr val="tx1"/>
+                </a:solidFill>
+              </a:endParaRPr>
+            </a:p>
+          </p:txBody>
+        </p:sp>
+      </p:grpSp>
+      <p:cxnSp>
+        <p:nvCxnSpPr>
+          <p:cNvPr id="26" name="Elbow Connector 25"/>
+          <p:cNvCxnSpPr>
+            <a:stCxn id="6" idx="0"/>
+            <a:endCxn id="9" idx="1"/>
+          </p:cNvCxnSpPr>
+          <p:nvPr/>
+        </p:nvCxnSpPr>
+        <p:spPr>
+          <a:xfrm rot="5400000" flipH="1" flipV="1">
+            <a:off x="2926314" y="1288073"/>
+            <a:ext cx="1585849" cy="270457"/>
           </a:xfrm>
           <a:prstGeom prst="bentConnector2">
             <a:avLst/>
@@ -9491,27 +9841,26 @@
       </p:cxnSp>
       <p:cxnSp>
         <p:nvCxnSpPr>
-          <p:cNvPr id="129" name="Elbow Connector 128"/>
-          <p:cNvCxnSpPr/>
+          <p:cNvPr id="125" name="Elbow Connector 124"/>
+          <p:cNvCxnSpPr>
+            <a:stCxn id="10" idx="1"/>
+          </p:cNvCxnSpPr>
           <p:nvPr/>
         </p:nvCxnSpPr>
         <p:spPr>
-          <a:xfrm>
-            <a:off x="5931243" y="2504305"/>
-            <a:ext cx="767321" cy="618"/>
-          </a:xfrm>
-          <a:prstGeom prst="bentConnector3">
-            <a:avLst>
-              <a:gd name="adj1" fmla="val 50000"/>
-            </a:avLst>
+          <a:xfrm rot="10800000">
+            <a:off x="3584009" y="2774580"/>
+            <a:ext cx="270458" cy="1451173"/>
+          </a:xfrm>
+          <a:prstGeom prst="bentConnector2">
+            <a:avLst/>
           </a:prstGeom>
           <a:ln w="19050">
             <a:solidFill>
               <a:srgbClr val="C00000"/>
             </a:solidFill>
             <a:prstDash val="sysDash"/>
-            <a:headEnd type="oval" w="med" len="med"/>
-            <a:tailEnd type="oval" w="lg" len="lg"/>
+            <a:tailEnd type="triangle" w="lg" len="lg"/>
           </a:ln>
         </p:spPr>
         <p:style>

</xml_diff>

<commit_message>
Docs: REAMDE.md - added TLDR summary in the top + updated concept illustration
</commit_message>
<xml_diff>
--- a/Docs/Concept.pptx
+++ b/Docs/Concept.pptx
@@ -244,7 +244,7 @@
           <a:p>
             <a:fld id="{A138F55C-582E-4B71-904C-0AE799693AB9}" type="datetimeFigureOut">
               <a:rPr lang="en-US" smtClean="0"/>
-              <a:t>8/6/2017</a:t>
+              <a:t>8/16/2017</a:t>
             </a:fld>
             <a:endParaRPr lang="en-US"/>
           </a:p>
@@ -414,7 +414,7 @@
           <a:p>
             <a:fld id="{A138F55C-582E-4B71-904C-0AE799693AB9}" type="datetimeFigureOut">
               <a:rPr lang="en-US" smtClean="0"/>
-              <a:t>8/6/2017</a:t>
+              <a:t>8/16/2017</a:t>
             </a:fld>
             <a:endParaRPr lang="en-US"/>
           </a:p>
@@ -594,7 +594,7 @@
           <a:p>
             <a:fld id="{A138F55C-582E-4B71-904C-0AE799693AB9}" type="datetimeFigureOut">
               <a:rPr lang="en-US" smtClean="0"/>
-              <a:t>8/6/2017</a:t>
+              <a:t>8/16/2017</a:t>
             </a:fld>
             <a:endParaRPr lang="en-US"/>
           </a:p>
@@ -764,7 +764,7 @@
           <a:p>
             <a:fld id="{A138F55C-582E-4B71-904C-0AE799693AB9}" type="datetimeFigureOut">
               <a:rPr lang="en-US" smtClean="0"/>
-              <a:t>8/6/2017</a:t>
+              <a:t>8/16/2017</a:t>
             </a:fld>
             <a:endParaRPr lang="en-US"/>
           </a:p>
@@ -1010,7 +1010,7 @@
           <a:p>
             <a:fld id="{A138F55C-582E-4B71-904C-0AE799693AB9}" type="datetimeFigureOut">
               <a:rPr lang="en-US" smtClean="0"/>
-              <a:t>8/6/2017</a:t>
+              <a:t>8/16/2017</a:t>
             </a:fld>
             <a:endParaRPr lang="en-US"/>
           </a:p>
@@ -1242,7 +1242,7 @@
           <a:p>
             <a:fld id="{A138F55C-582E-4B71-904C-0AE799693AB9}" type="datetimeFigureOut">
               <a:rPr lang="en-US" smtClean="0"/>
-              <a:t>8/6/2017</a:t>
+              <a:t>8/16/2017</a:t>
             </a:fld>
             <a:endParaRPr lang="en-US"/>
           </a:p>
@@ -1609,7 +1609,7 @@
           <a:p>
             <a:fld id="{A138F55C-582E-4B71-904C-0AE799693AB9}" type="datetimeFigureOut">
               <a:rPr lang="en-US" smtClean="0"/>
-              <a:t>8/6/2017</a:t>
+              <a:t>8/16/2017</a:t>
             </a:fld>
             <a:endParaRPr lang="en-US"/>
           </a:p>
@@ -1727,7 +1727,7 @@
           <a:p>
             <a:fld id="{A138F55C-582E-4B71-904C-0AE799693AB9}" type="datetimeFigureOut">
               <a:rPr lang="en-US" smtClean="0"/>
-              <a:t>8/6/2017</a:t>
+              <a:t>8/16/2017</a:t>
             </a:fld>
             <a:endParaRPr lang="en-US"/>
           </a:p>
@@ -1822,7 +1822,7 @@
           <a:p>
             <a:fld id="{A138F55C-582E-4B71-904C-0AE799693AB9}" type="datetimeFigureOut">
               <a:rPr lang="en-US" smtClean="0"/>
-              <a:t>8/6/2017</a:t>
+              <a:t>8/16/2017</a:t>
             </a:fld>
             <a:endParaRPr lang="en-US"/>
           </a:p>
@@ -2099,7 +2099,7 @@
           <a:p>
             <a:fld id="{A138F55C-582E-4B71-904C-0AE799693AB9}" type="datetimeFigureOut">
               <a:rPr lang="en-US" smtClean="0"/>
-              <a:t>8/6/2017</a:t>
+              <a:t>8/16/2017</a:t>
             </a:fld>
             <a:endParaRPr lang="en-US"/>
           </a:p>
@@ -2352,7 +2352,7 @@
           <a:p>
             <a:fld id="{A138F55C-582E-4B71-904C-0AE799693AB9}" type="datetimeFigureOut">
               <a:rPr lang="en-US" smtClean="0"/>
-              <a:t>8/6/2017</a:t>
+              <a:t>8/16/2017</a:t>
             </a:fld>
             <a:endParaRPr lang="en-US"/>
           </a:p>
@@ -2565,7 +2565,7 @@
           <a:p>
             <a:fld id="{A138F55C-582E-4B71-904C-0AE799693AB9}" type="datetimeFigureOut">
               <a:rPr lang="en-US" smtClean="0"/>
-              <a:t>8/6/2017</a:t>
+              <a:t>8/16/2017</a:t>
             </a:fld>
             <a:endParaRPr lang="en-US"/>
           </a:p>
@@ -2993,7 +2993,7 @@
         </p:blipFill>
         <p:spPr bwMode="auto">
           <a:xfrm>
-            <a:off x="8608477" y="3776572"/>
+            <a:off x="8762452" y="3841851"/>
             <a:ext cx="345690" cy="345690"/>
           </a:xfrm>
           <a:prstGeom prst="rect">
@@ -3032,7 +3032,7 @@
         </p:blipFill>
         <p:spPr bwMode="auto">
           <a:xfrm>
-            <a:off x="8647056" y="3532097"/>
+            <a:off x="8783506" y="3519439"/>
             <a:ext cx="695813" cy="244475"/>
           </a:xfrm>
           <a:prstGeom prst="rect">
@@ -3142,7 +3142,7 @@
         </p:blipFill>
         <p:spPr>
           <a:xfrm>
-            <a:off x="6654337" y="1332559"/>
+            <a:off x="6692437" y="1332559"/>
             <a:ext cx="386564" cy="357151"/>
           </a:xfrm>
           <a:prstGeom prst="rect">
@@ -3341,7 +3341,7 @@
         </p:blipFill>
         <p:spPr bwMode="auto">
           <a:xfrm>
-            <a:off x="5092090" y="883043"/>
+            <a:off x="5060340" y="883043"/>
             <a:ext cx="670910" cy="404071"/>
           </a:xfrm>
           <a:prstGeom prst="rect">
@@ -3891,7 +3891,7 @@
         </p:blipFill>
         <p:spPr bwMode="auto">
           <a:xfrm>
-            <a:off x="5371299" y="1343992"/>
+            <a:off x="5326849" y="1343992"/>
             <a:ext cx="355638" cy="355638"/>
           </a:xfrm>
           <a:prstGeom prst="rect">
@@ -3930,7 +3930,7 @@
         </p:blipFill>
         <p:spPr bwMode="auto">
           <a:xfrm flipV="1">
-            <a:off x="6026430" y="1277925"/>
+            <a:off x="6229630" y="1290625"/>
             <a:ext cx="397746" cy="359987"/>
           </a:xfrm>
           <a:prstGeom prst="rect">
@@ -5804,22 +5804,7 @@
                   <a:schemeClr val="tx1"/>
                 </a:solidFill>
               </a:rPr>
-              <a:t>payment</a:t>
-            </a:r>
-            <a:br>
-              <a:rPr lang="en-US" sz="1200" spc="-50" dirty="0" smtClean="0">
-                <a:solidFill>
-                  <a:schemeClr val="tx1"/>
-                </a:solidFill>
-              </a:rPr>
-            </a:br>
-            <a:r>
-              <a:rPr lang="en-US" sz="1200" spc="-50" dirty="0" smtClean="0">
-                <a:solidFill>
-                  <a:schemeClr val="tx1"/>
-                </a:solidFill>
-              </a:rPr>
-              <a:t>gateways</a:t>
+              <a:t>SaaS</a:t>
             </a:r>
             <a:endParaRPr lang="en-US" sz="1200" spc="-50" dirty="0">
               <a:solidFill>
@@ -5881,12 +5866,35 @@
               </a:lnSpc>
             </a:pPr>
             <a:r>
+              <a:rPr lang="en-US" sz="1200" spc="-50" dirty="0">
+                <a:solidFill>
+                  <a:schemeClr val="tx1"/>
+                </a:solidFill>
+              </a:rPr>
+              <a:t>p</a:t>
+            </a:r>
+            <a:r>
               <a:rPr lang="en-US" sz="1200" spc="-50" dirty="0" smtClean="0">
                 <a:solidFill>
                   <a:schemeClr val="tx1"/>
                 </a:solidFill>
               </a:rPr>
-              <a:t>booking</a:t>
+              <a:t>oint of</a:t>
+            </a:r>
+            <a:br>
+              <a:rPr lang="en-US" sz="1200" spc="-50" dirty="0" smtClean="0">
+                <a:solidFill>
+                  <a:schemeClr val="tx1"/>
+                </a:solidFill>
+              </a:rPr>
+            </a:br>
+            <a:r>
+              <a:rPr lang="en-US" sz="1200" spc="-50" dirty="0" smtClean="0">
+                <a:solidFill>
+                  <a:schemeClr val="tx1"/>
+                </a:solidFill>
+              </a:rPr>
+              <a:t>sale</a:t>
             </a:r>
             <a:endParaRPr lang="en-US" sz="1200" spc="-50" dirty="0">
               <a:solidFill>
@@ -6104,6 +6112,14 @@
               </a:rPr>
               <a:t>report</a:t>
             </a:r>
+            <a:r>
+              <a:rPr lang="en-US" sz="1200" spc="-50" dirty="0" smtClean="0">
+                <a:solidFill>
+                  <a:schemeClr val="tx1"/>
+                </a:solidFill>
+              </a:rPr>
+              <a:t/>
+            </a:r>
             <a:br>
               <a:rPr lang="en-US" sz="1200" spc="-50" dirty="0" smtClean="0">
                 <a:solidFill>
@@ -6179,12 +6195,20 @@
               </a:lnSpc>
             </a:pPr>
             <a:r>
+              <a:rPr lang="en-US" sz="1200" spc="-50" dirty="0">
+                <a:solidFill>
+                  <a:schemeClr val="tx1"/>
+                </a:solidFill>
+              </a:rPr>
+              <a:t>p</a:t>
+            </a:r>
+            <a:r>
               <a:rPr lang="en-US" sz="1200" spc="-50" dirty="0" smtClean="0">
                 <a:solidFill>
                   <a:schemeClr val="tx1"/>
                 </a:solidFill>
               </a:rPr>
-              <a:t>point of sale</a:t>
+              <a:t>ayment gateways</a:t>
             </a:r>
             <a:endParaRPr lang="en-US" sz="1200" spc="-50" dirty="0">
               <a:solidFill>
@@ -6251,7 +6275,7 @@
                   <a:schemeClr val="tx1"/>
                 </a:solidFill>
               </a:rPr>
-              <a:t>shipment</a:t>
+              <a:t>shipping</a:t>
             </a:r>
             <a:endParaRPr lang="en-US" sz="1200" spc="-50" dirty="0">
               <a:solidFill>
@@ -6400,7 +6424,7 @@
                   <a:schemeClr val="tx1"/>
                 </a:solidFill>
               </a:rPr>
-              <a:t>book-keeping</a:t>
+              <a:t>accounting</a:t>
             </a:r>
             <a:endParaRPr lang="en-US" sz="1200" spc="-50" dirty="0">
               <a:solidFill>
@@ -6462,35 +6486,12 @@
               </a:lnSpc>
             </a:pPr>
             <a:r>
-              <a:rPr lang="en-US" sz="1200" spc="-50" dirty="0">
+              <a:rPr lang="en-US" sz="1200" spc="-50" dirty="0" smtClean="0">
                 <a:solidFill>
                   <a:schemeClr val="tx1"/>
                 </a:solidFill>
               </a:rPr>
-              <a:t>i</a:t>
-            </a:r>
-            <a:r>
-              <a:rPr lang="en-US" sz="1200" spc="-50" dirty="0" smtClean="0">
-                <a:solidFill>
-                  <a:schemeClr val="tx1"/>
-                </a:solidFill>
-              </a:rPr>
-              <a:t>nventory</a:t>
-            </a:r>
-            <a:br>
-              <a:rPr lang="en-US" sz="1200" spc="-50" dirty="0" smtClean="0">
-                <a:solidFill>
-                  <a:schemeClr val="tx1"/>
-                </a:solidFill>
-              </a:rPr>
-            </a:br>
-            <a:r>
-              <a:rPr lang="en-US" sz="1200" spc="-50" dirty="0" smtClean="0">
-                <a:solidFill>
-                  <a:schemeClr val="tx1"/>
-                </a:solidFill>
-              </a:rPr>
-              <a:t>stock</a:t>
+              <a:t>billing</a:t>
             </a:r>
             <a:endParaRPr lang="en-US" sz="1200" spc="-50" dirty="0">
               <a:solidFill>
@@ -7253,27 +7254,12 @@
               </a:lnSpc>
             </a:pPr>
             <a:r>
-              <a:rPr lang="en-US" sz="1200" spc="-50" dirty="0">
+              <a:rPr lang="en-US" sz="1200" spc="-50" dirty="0" smtClean="0">
                 <a:solidFill>
                   <a:schemeClr val="tx1"/>
                 </a:solidFill>
               </a:rPr>
-              <a:t>logistics &amp;</a:t>
-            </a:r>
-            <a:br>
-              <a:rPr lang="en-US" sz="1200" spc="-50" dirty="0">
-                <a:solidFill>
-                  <a:schemeClr val="tx1"/>
-                </a:solidFill>
-              </a:rPr>
-            </a:br>
-            <a:r>
-              <a:rPr lang="en-US" sz="1200" spc="-50" dirty="0" smtClean="0">
-                <a:solidFill>
-                  <a:schemeClr val="tx1"/>
-                </a:solidFill>
-              </a:rPr>
-              <a:t>transport</a:t>
+              <a:t>marketing</a:t>
             </a:r>
             <a:endParaRPr lang="en-US" sz="1200" spc="-50" dirty="0">
               <a:solidFill>
@@ -7340,7 +7326,7 @@
                   <a:schemeClr val="tx1"/>
                 </a:solidFill>
               </a:rPr>
-              <a:t>ERP</a:t>
+              <a:t>booking</a:t>
             </a:r>
             <a:endParaRPr lang="en-US" sz="1200" spc="-50" dirty="0">
               <a:solidFill>
@@ -7407,7 +7393,7 @@
                   <a:schemeClr val="tx1"/>
                 </a:solidFill>
               </a:rPr>
-              <a:t>HR</a:t>
+              <a:t>inventory</a:t>
             </a:r>
             <a:endParaRPr lang="en-US" sz="1200" spc="-50" dirty="0">
               <a:solidFill>
@@ -7474,22 +7460,7 @@
                   <a:schemeClr val="tx1"/>
                 </a:solidFill>
               </a:rPr>
-              <a:t>health-</a:t>
-            </a:r>
-            <a:br>
-              <a:rPr lang="en-US" sz="1200" spc="-50" dirty="0" smtClean="0">
-                <a:solidFill>
-                  <a:schemeClr val="tx1"/>
-                </a:solidFill>
-              </a:rPr>
-            </a:br>
-            <a:r>
-              <a:rPr lang="en-US" sz="1200" spc="-50" dirty="0" smtClean="0">
-                <a:solidFill>
-                  <a:schemeClr val="tx1"/>
-                </a:solidFill>
-              </a:rPr>
-              <a:t>care</a:t>
+              <a:t> ?</a:t>
             </a:r>
             <a:endParaRPr lang="en-US" sz="1200" spc="-50" dirty="0">
               <a:solidFill>
@@ -7854,37 +7825,7 @@
                   <a:schemeClr val="tx1"/>
                 </a:solidFill>
               </a:rPr>
-              <a:t>and </a:t>
-            </a:r>
-            <a:br>
-              <a:rPr lang="en-US" sz="1200" spc="-50" dirty="0" smtClean="0">
-                <a:solidFill>
-                  <a:schemeClr val="tx1"/>
-                </a:solidFill>
-              </a:rPr>
-            </a:br>
-            <a:r>
-              <a:rPr lang="en-US" sz="1200" spc="-50" dirty="0" smtClean="0">
-                <a:solidFill>
-                  <a:schemeClr val="tx1"/>
-                </a:solidFill>
-              </a:rPr>
-              <a:t>more</a:t>
-            </a:r>
-            <a:br>
-              <a:rPr lang="en-US" sz="1200" spc="-50" dirty="0" smtClean="0">
-                <a:solidFill>
-                  <a:schemeClr val="tx1"/>
-                </a:solidFill>
-              </a:rPr>
-            </a:br>
-            <a:r>
-              <a:rPr lang="en-US" sz="1200" spc="-50" dirty="0" smtClean="0">
-                <a:solidFill>
-                  <a:schemeClr val="tx1"/>
-                </a:solidFill>
-              </a:rPr>
-              <a:t>…..</a:t>
+              <a:t>?</a:t>
             </a:r>
             <a:endParaRPr lang="en-US" sz="1200" spc="-50" dirty="0">
               <a:solidFill>
@@ -7894,6 +7835,52 @@
           </a:p>
         </p:txBody>
       </p:sp>
+      <p:pic>
+        <p:nvPicPr>
+          <p:cNvPr id="7" name="Picture 2" descr="Image result for polymer logo"/>
+          <p:cNvPicPr>
+            <a:picLocks noChangeAspect="1" noChangeArrowheads="1"/>
+          </p:cNvPicPr>
+          <p:nvPr/>
+        </p:nvPicPr>
+        <p:blipFill>
+          <a:blip r:embed="rId48" cstate="print">
+            <a:extLst>
+              <a:ext uri="{28A0092B-C50C-407E-A947-70E740481C1C}">
+                <a14:useLocalDpi xmlns:a14="http://schemas.microsoft.com/office/drawing/2010/main" val="0"/>
+              </a:ext>
+            </a:extLst>
+          </a:blip>
+          <a:srcRect/>
+          <a:stretch>
+            <a:fillRect/>
+          </a:stretch>
+        </p:blipFill>
+        <p:spPr bwMode="auto">
+          <a:xfrm>
+            <a:off x="5798580" y="1285884"/>
+            <a:ext cx="371305" cy="371305"/>
+          </a:xfrm>
+          <a:prstGeom prst="rect">
+            <a:avLst/>
+          </a:prstGeom>
+          <a:noFill/>
+          <a:ln w="3175">
+            <a:solidFill>
+              <a:schemeClr val="tx1"/>
+            </a:solidFill>
+          </a:ln>
+          <a:extLst>
+            <a:ext uri="{909E8E84-426E-40DD-AFC4-6F175D3DCCD1}">
+              <a14:hiddenFill xmlns:a14="http://schemas.microsoft.com/office/drawing/2010/main">
+                <a:solidFill>
+                  <a:srgbClr val="FFFFFF"/>
+                </a:solidFill>
+              </a14:hiddenFill>
+            </a:ext>
+          </a:extLst>
+        </p:spPr>
+      </p:pic>
     </p:spTree>
     <p:extLst>
       <p:ext uri="{BB962C8B-B14F-4D97-AF65-F5344CB8AC3E}">

</xml_diff>

<commit_message>
Docs: added new thumbnail illustration of concept in README.md
</commit_message>
<xml_diff>
--- a/Docs/Concept.pptx
+++ b/Docs/Concept.pptx
@@ -7,6 +7,7 @@
   <p:sldIdLst>
     <p:sldId id="256" r:id="rId2"/>
     <p:sldId id="257" r:id="rId3"/>
+    <p:sldId id="258" r:id="rId4"/>
   </p:sldIdLst>
   <p:sldSz cx="12192000" cy="6858000"/>
   <p:notesSz cx="6858000" cy="9144000"/>
@@ -6112,14 +6113,6 @@
               </a:rPr>
               <a:t>report</a:t>
             </a:r>
-            <a:r>
-              <a:rPr lang="en-US" sz="1200" spc="-50" dirty="0" smtClean="0">
-                <a:solidFill>
-                  <a:schemeClr val="tx1"/>
-                </a:solidFill>
-              </a:rPr>
-              <a:t/>
-            </a:r>
             <a:br>
               <a:rPr lang="en-US" sz="1200" spc="-50" dirty="0" smtClean="0">
                 <a:solidFill>
@@ -9869,6 +9862,889 @@
     <p:extLst>
       <p:ext uri="{BB962C8B-B14F-4D97-AF65-F5344CB8AC3E}">
         <p14:creationId xmlns:p14="http://schemas.microsoft.com/office/powerpoint/2010/main" val="3570073285"/>
+      </p:ext>
+    </p:extLst>
+  </p:cSld>
+  <p:clrMapOvr>
+    <a:masterClrMapping/>
+  </p:clrMapOvr>
+  <p:timing>
+    <p:tnLst>
+      <p:par>
+        <p:cTn id="1" dur="indefinite" restart="never" nodeType="tmRoot"/>
+      </p:par>
+    </p:tnLst>
+  </p:timing>
+</p:sld>
+</file>
+
+<file path=ppt/slides/slide3.xml><?xml version="1.0" encoding="utf-8"?>
+<p:sld xmlns:a="http://schemas.openxmlformats.org/drawingml/2006/main" xmlns:r="http://schemas.openxmlformats.org/officeDocument/2006/relationships" xmlns:p="http://schemas.openxmlformats.org/presentationml/2006/main">
+  <p:cSld>
+    <p:spTree>
+      <p:nvGrpSpPr>
+        <p:cNvPr id="1" name=""/>
+        <p:cNvGrpSpPr/>
+        <p:nvPr/>
+      </p:nvGrpSpPr>
+      <p:grpSpPr>
+        <a:xfrm>
+          <a:off x="0" y="0"/>
+          <a:ext cx="0" cy="0"/>
+          <a:chOff x="0" y="0"/>
+          <a:chExt cx="0" cy="0"/>
+        </a:xfrm>
+      </p:grpSpPr>
+      <p:grpSp>
+        <p:nvGrpSpPr>
+          <p:cNvPr id="34" name="Group 33"/>
+          <p:cNvGrpSpPr/>
+          <p:nvPr/>
+        </p:nvGrpSpPr>
+        <p:grpSpPr>
+          <a:xfrm>
+            <a:off x="4727010" y="2100690"/>
+            <a:ext cx="2626285" cy="1899810"/>
+            <a:chOff x="4727015" y="2100690"/>
+            <a:chExt cx="3359820" cy="2583812"/>
+          </a:xfrm>
+        </p:grpSpPr>
+        <p:sp>
+          <p:nvSpPr>
+            <p:cNvPr id="16" name="Hexagon 15"/>
+            <p:cNvSpPr/>
+            <p:nvPr/>
+          </p:nvSpPr>
+          <p:spPr>
+            <a:xfrm>
+              <a:off x="4727015" y="2100690"/>
+              <a:ext cx="2864966" cy="2472689"/>
+            </a:xfrm>
+            <a:prstGeom prst="hexagon">
+              <a:avLst/>
+            </a:prstGeom>
+            <a:solidFill>
+              <a:schemeClr val="bg1">
+                <a:lumMod val="95000"/>
+              </a:schemeClr>
+            </a:solidFill>
+            <a:ln>
+              <a:noFill/>
+            </a:ln>
+          </p:spPr>
+          <p:style>
+            <a:lnRef idx="2">
+              <a:schemeClr val="accent1">
+                <a:shade val="50000"/>
+              </a:schemeClr>
+            </a:lnRef>
+            <a:fillRef idx="1">
+              <a:schemeClr val="accent1"/>
+            </a:fillRef>
+            <a:effectRef idx="0">
+              <a:schemeClr val="accent1"/>
+            </a:effectRef>
+            <a:fontRef idx="minor">
+              <a:schemeClr val="lt1"/>
+            </a:fontRef>
+          </p:style>
+          <p:txBody>
+            <a:bodyPr rtlCol="0" anchor="t"/>
+            <a:lstStyle/>
+            <a:p>
+              <a:pPr algn="ctr"/>
+              <a:endParaRPr lang="en-US" sz="1100" dirty="0"/>
+            </a:p>
+          </p:txBody>
+        </p:sp>
+        <p:sp>
+          <p:nvSpPr>
+            <p:cNvPr id="4" name="Hexagon 3"/>
+            <p:cNvSpPr/>
+            <p:nvPr/>
+          </p:nvSpPr>
+          <p:spPr>
+            <a:xfrm>
+              <a:off x="5219375" y="2542070"/>
+              <a:ext cx="1842163" cy="1589930"/>
+            </a:xfrm>
+            <a:prstGeom prst="hexagon">
+              <a:avLst/>
+            </a:prstGeom>
+            <a:solidFill>
+              <a:srgbClr val="8BCDFF"/>
+            </a:solidFill>
+            <a:ln>
+              <a:noFill/>
+            </a:ln>
+          </p:spPr>
+          <p:style>
+            <a:lnRef idx="2">
+              <a:schemeClr val="accent1">
+                <a:shade val="50000"/>
+              </a:schemeClr>
+            </a:lnRef>
+            <a:fillRef idx="1">
+              <a:schemeClr val="accent1"/>
+            </a:fillRef>
+            <a:effectRef idx="0">
+              <a:schemeClr val="accent1"/>
+            </a:effectRef>
+            <a:fontRef idx="minor">
+              <a:schemeClr val="lt1"/>
+            </a:fontRef>
+          </p:style>
+          <p:txBody>
+            <a:bodyPr rtlCol="0" anchor="t"/>
+            <a:lstStyle/>
+            <a:p>
+              <a:pPr algn="ctr"/>
+              <a:endParaRPr lang="en-US" sz="1100" dirty="0"/>
+            </a:p>
+          </p:txBody>
+        </p:sp>
+        <p:sp>
+          <p:nvSpPr>
+            <p:cNvPr id="5" name="Hexagon 4"/>
+            <p:cNvSpPr/>
+            <p:nvPr/>
+          </p:nvSpPr>
+          <p:spPr>
+            <a:xfrm>
+              <a:off x="5728944" y="2977403"/>
+              <a:ext cx="861111" cy="719266"/>
+            </a:xfrm>
+            <a:prstGeom prst="hexagon">
+              <a:avLst/>
+            </a:prstGeom>
+            <a:solidFill>
+              <a:srgbClr val="00B050"/>
+            </a:solidFill>
+            <a:ln>
+              <a:solidFill>
+                <a:srgbClr val="00B050"/>
+              </a:solidFill>
+            </a:ln>
+          </p:spPr>
+          <p:style>
+            <a:lnRef idx="2">
+              <a:schemeClr val="accent1">
+                <a:shade val="50000"/>
+              </a:schemeClr>
+            </a:lnRef>
+            <a:fillRef idx="1">
+              <a:schemeClr val="accent1"/>
+            </a:fillRef>
+            <a:effectRef idx="0">
+              <a:schemeClr val="accent1"/>
+            </a:effectRef>
+            <a:fontRef idx="minor">
+              <a:schemeClr val="lt1"/>
+            </a:fontRef>
+          </p:style>
+          <p:txBody>
+            <a:bodyPr lIns="0" tIns="0" rIns="0" bIns="0" rtlCol="0" anchor="t" anchorCtr="1"/>
+            <a:lstStyle/>
+            <a:p>
+              <a:pPr algn="ctr"/>
+              <a:r>
+                <a:rPr lang="en-US" sz="1100" dirty="0" smtClean="0"/>
+                <a:t>app</a:t>
+              </a:r>
+              <a:endParaRPr lang="en-US" sz="1100" dirty="0"/>
+            </a:p>
+          </p:txBody>
+        </p:sp>
+        <p:sp>
+          <p:nvSpPr>
+            <p:cNvPr id="6" name="Rectangle 5"/>
+            <p:cNvSpPr/>
+            <p:nvPr/>
+          </p:nvSpPr>
+          <p:spPr>
+            <a:xfrm>
+              <a:off x="5983288" y="3476625"/>
+              <a:ext cx="120650" cy="111125"/>
+            </a:xfrm>
+            <a:prstGeom prst="rect">
+              <a:avLst/>
+            </a:prstGeom>
+            <a:solidFill>
+              <a:schemeClr val="accent4">
+                <a:lumMod val="60000"/>
+                <a:lumOff val="40000"/>
+              </a:schemeClr>
+            </a:solidFill>
+            <a:ln>
+              <a:solidFill>
+                <a:srgbClr val="00B050"/>
+              </a:solidFill>
+            </a:ln>
+          </p:spPr>
+          <p:style>
+            <a:lnRef idx="2">
+              <a:schemeClr val="accent1">
+                <a:shade val="50000"/>
+              </a:schemeClr>
+            </a:lnRef>
+            <a:fillRef idx="1">
+              <a:schemeClr val="accent1"/>
+            </a:fillRef>
+            <a:effectRef idx="0">
+              <a:schemeClr val="accent1"/>
+            </a:effectRef>
+            <a:fontRef idx="minor">
+              <a:schemeClr val="lt1"/>
+            </a:fontRef>
+          </p:style>
+          <p:txBody>
+            <a:bodyPr rtlCol="0" anchor="ctr"/>
+            <a:lstStyle/>
+            <a:p>
+              <a:pPr algn="ctr"/>
+              <a:endParaRPr lang="en-US" sz="1100"/>
+            </a:p>
+          </p:txBody>
+        </p:sp>
+        <p:sp>
+          <p:nvSpPr>
+            <p:cNvPr id="7" name="Rectangle 6"/>
+            <p:cNvSpPr/>
+            <p:nvPr/>
+          </p:nvSpPr>
+          <p:spPr>
+            <a:xfrm>
+              <a:off x="6108259" y="3476624"/>
+              <a:ext cx="120650" cy="111125"/>
+            </a:xfrm>
+            <a:prstGeom prst="rect">
+              <a:avLst/>
+            </a:prstGeom>
+            <a:solidFill>
+              <a:schemeClr val="accent4">
+                <a:lumMod val="60000"/>
+                <a:lumOff val="40000"/>
+              </a:schemeClr>
+            </a:solidFill>
+            <a:ln>
+              <a:solidFill>
+                <a:srgbClr val="00B050"/>
+              </a:solidFill>
+            </a:ln>
+          </p:spPr>
+          <p:style>
+            <a:lnRef idx="2">
+              <a:schemeClr val="accent1">
+                <a:shade val="50000"/>
+              </a:schemeClr>
+            </a:lnRef>
+            <a:fillRef idx="1">
+              <a:schemeClr val="accent1"/>
+            </a:fillRef>
+            <a:effectRef idx="0">
+              <a:schemeClr val="accent1"/>
+            </a:effectRef>
+            <a:fontRef idx="minor">
+              <a:schemeClr val="lt1"/>
+            </a:fontRef>
+          </p:style>
+          <p:txBody>
+            <a:bodyPr rtlCol="0" anchor="ctr"/>
+            <a:lstStyle/>
+            <a:p>
+              <a:pPr algn="ctr"/>
+              <a:endParaRPr lang="en-US" sz="1100"/>
+            </a:p>
+          </p:txBody>
+        </p:sp>
+        <p:sp>
+          <p:nvSpPr>
+            <p:cNvPr id="8" name="Rectangle 7"/>
+            <p:cNvSpPr/>
+            <p:nvPr/>
+          </p:nvSpPr>
+          <p:spPr>
+            <a:xfrm>
+              <a:off x="6234664" y="3476624"/>
+              <a:ext cx="120650" cy="111125"/>
+            </a:xfrm>
+            <a:prstGeom prst="rect">
+              <a:avLst/>
+            </a:prstGeom>
+            <a:solidFill>
+              <a:schemeClr val="accent4">
+                <a:lumMod val="60000"/>
+                <a:lumOff val="40000"/>
+              </a:schemeClr>
+            </a:solidFill>
+            <a:ln>
+              <a:solidFill>
+                <a:srgbClr val="00B050"/>
+              </a:solidFill>
+            </a:ln>
+          </p:spPr>
+          <p:style>
+            <a:lnRef idx="2">
+              <a:schemeClr val="accent1">
+                <a:shade val="50000"/>
+              </a:schemeClr>
+            </a:lnRef>
+            <a:fillRef idx="1">
+              <a:schemeClr val="accent1"/>
+            </a:fillRef>
+            <a:effectRef idx="0">
+              <a:schemeClr val="accent1"/>
+            </a:effectRef>
+            <a:fontRef idx="minor">
+              <a:schemeClr val="lt1"/>
+            </a:fontRef>
+          </p:style>
+          <p:txBody>
+            <a:bodyPr rtlCol="0" anchor="ctr"/>
+            <a:lstStyle/>
+            <a:p>
+              <a:pPr algn="ctr"/>
+              <a:endParaRPr lang="en-US" sz="1100"/>
+            </a:p>
+          </p:txBody>
+        </p:sp>
+        <p:sp>
+          <p:nvSpPr>
+            <p:cNvPr id="9" name="Rectangle 8"/>
+            <p:cNvSpPr/>
+            <p:nvPr/>
+          </p:nvSpPr>
+          <p:spPr>
+            <a:xfrm>
+              <a:off x="5915645" y="3587749"/>
+              <a:ext cx="120650" cy="111125"/>
+            </a:xfrm>
+            <a:prstGeom prst="rect">
+              <a:avLst/>
+            </a:prstGeom>
+            <a:solidFill>
+              <a:schemeClr val="accent4">
+                <a:lumMod val="60000"/>
+                <a:lumOff val="40000"/>
+              </a:schemeClr>
+            </a:solidFill>
+            <a:ln>
+              <a:solidFill>
+                <a:srgbClr val="00B050"/>
+              </a:solidFill>
+            </a:ln>
+          </p:spPr>
+          <p:style>
+            <a:lnRef idx="2">
+              <a:schemeClr val="accent1">
+                <a:shade val="50000"/>
+              </a:schemeClr>
+            </a:lnRef>
+            <a:fillRef idx="1">
+              <a:schemeClr val="accent1"/>
+            </a:fillRef>
+            <a:effectRef idx="0">
+              <a:schemeClr val="accent1"/>
+            </a:effectRef>
+            <a:fontRef idx="minor">
+              <a:schemeClr val="lt1"/>
+            </a:fontRef>
+          </p:style>
+          <p:txBody>
+            <a:bodyPr rtlCol="0" anchor="ctr"/>
+            <a:lstStyle/>
+            <a:p>
+              <a:pPr algn="ctr"/>
+              <a:endParaRPr lang="en-US" sz="1100"/>
+            </a:p>
+          </p:txBody>
+        </p:sp>
+        <p:sp>
+          <p:nvSpPr>
+            <p:cNvPr id="10" name="Rectangle 9"/>
+            <p:cNvSpPr/>
+            <p:nvPr/>
+          </p:nvSpPr>
+          <p:spPr>
+            <a:xfrm>
+              <a:off x="6038850" y="3587748"/>
+              <a:ext cx="120650" cy="111125"/>
+            </a:xfrm>
+            <a:prstGeom prst="rect">
+              <a:avLst/>
+            </a:prstGeom>
+            <a:solidFill>
+              <a:schemeClr val="accent4">
+                <a:lumMod val="60000"/>
+                <a:lumOff val="40000"/>
+              </a:schemeClr>
+            </a:solidFill>
+            <a:ln>
+              <a:solidFill>
+                <a:srgbClr val="00B050"/>
+              </a:solidFill>
+            </a:ln>
+          </p:spPr>
+          <p:style>
+            <a:lnRef idx="2">
+              <a:schemeClr val="accent1">
+                <a:shade val="50000"/>
+              </a:schemeClr>
+            </a:lnRef>
+            <a:fillRef idx="1">
+              <a:schemeClr val="accent1"/>
+            </a:fillRef>
+            <a:effectRef idx="0">
+              <a:schemeClr val="accent1"/>
+            </a:effectRef>
+            <a:fontRef idx="minor">
+              <a:schemeClr val="lt1"/>
+            </a:fontRef>
+          </p:style>
+          <p:txBody>
+            <a:bodyPr rtlCol="0" anchor="ctr"/>
+            <a:lstStyle/>
+            <a:p>
+              <a:pPr algn="ctr"/>
+              <a:endParaRPr lang="en-US" sz="1100"/>
+            </a:p>
+          </p:txBody>
+        </p:sp>
+        <p:sp>
+          <p:nvSpPr>
+            <p:cNvPr id="11" name="Rectangle 10"/>
+            <p:cNvSpPr/>
+            <p:nvPr/>
+          </p:nvSpPr>
+          <p:spPr>
+            <a:xfrm>
+              <a:off x="6162330" y="3587747"/>
+              <a:ext cx="120650" cy="111125"/>
+            </a:xfrm>
+            <a:prstGeom prst="rect">
+              <a:avLst/>
+            </a:prstGeom>
+            <a:solidFill>
+              <a:schemeClr val="accent4">
+                <a:lumMod val="60000"/>
+                <a:lumOff val="40000"/>
+              </a:schemeClr>
+            </a:solidFill>
+            <a:ln>
+              <a:solidFill>
+                <a:srgbClr val="00B050"/>
+              </a:solidFill>
+            </a:ln>
+          </p:spPr>
+          <p:style>
+            <a:lnRef idx="2">
+              <a:schemeClr val="accent1">
+                <a:shade val="50000"/>
+              </a:schemeClr>
+            </a:lnRef>
+            <a:fillRef idx="1">
+              <a:schemeClr val="accent1"/>
+            </a:fillRef>
+            <a:effectRef idx="0">
+              <a:schemeClr val="accent1"/>
+            </a:effectRef>
+            <a:fontRef idx="minor">
+              <a:schemeClr val="lt1"/>
+            </a:fontRef>
+          </p:style>
+          <p:txBody>
+            <a:bodyPr rtlCol="0" anchor="ctr"/>
+            <a:lstStyle/>
+            <a:p>
+              <a:pPr algn="ctr"/>
+              <a:endParaRPr lang="en-US" sz="1100"/>
+            </a:p>
+          </p:txBody>
+        </p:sp>
+        <p:sp>
+          <p:nvSpPr>
+            <p:cNvPr id="12" name="Rectangle 11"/>
+            <p:cNvSpPr/>
+            <p:nvPr/>
+          </p:nvSpPr>
+          <p:spPr>
+            <a:xfrm>
+              <a:off x="6286216" y="3587747"/>
+              <a:ext cx="120650" cy="111125"/>
+            </a:xfrm>
+            <a:prstGeom prst="rect">
+              <a:avLst/>
+            </a:prstGeom>
+            <a:solidFill>
+              <a:schemeClr val="accent4">
+                <a:lumMod val="60000"/>
+                <a:lumOff val="40000"/>
+              </a:schemeClr>
+            </a:solidFill>
+            <a:ln>
+              <a:solidFill>
+                <a:srgbClr val="00B050"/>
+              </a:solidFill>
+            </a:ln>
+          </p:spPr>
+          <p:style>
+            <a:lnRef idx="2">
+              <a:schemeClr val="accent1">
+                <a:shade val="50000"/>
+              </a:schemeClr>
+            </a:lnRef>
+            <a:fillRef idx="1">
+              <a:schemeClr val="accent1"/>
+            </a:fillRef>
+            <a:effectRef idx="0">
+              <a:schemeClr val="accent1"/>
+            </a:effectRef>
+            <a:fontRef idx="minor">
+              <a:schemeClr val="lt1"/>
+            </a:fontRef>
+          </p:style>
+          <p:txBody>
+            <a:bodyPr rtlCol="0" anchor="ctr"/>
+            <a:lstStyle/>
+            <a:p>
+              <a:pPr algn="ctr"/>
+              <a:endParaRPr lang="en-US" sz="1100"/>
+            </a:p>
+          </p:txBody>
+        </p:sp>
+        <p:sp>
+          <p:nvSpPr>
+            <p:cNvPr id="13" name="Rectangle 12"/>
+            <p:cNvSpPr/>
+            <p:nvPr/>
+          </p:nvSpPr>
+          <p:spPr>
+            <a:xfrm>
+              <a:off x="6051944" y="3365498"/>
+              <a:ext cx="120650" cy="111125"/>
+            </a:xfrm>
+            <a:prstGeom prst="rect">
+              <a:avLst/>
+            </a:prstGeom>
+            <a:solidFill>
+              <a:schemeClr val="accent4">
+                <a:lumMod val="60000"/>
+                <a:lumOff val="40000"/>
+              </a:schemeClr>
+            </a:solidFill>
+            <a:ln>
+              <a:solidFill>
+                <a:srgbClr val="00B050"/>
+              </a:solidFill>
+            </a:ln>
+          </p:spPr>
+          <p:style>
+            <a:lnRef idx="2">
+              <a:schemeClr val="accent1">
+                <a:shade val="50000"/>
+              </a:schemeClr>
+            </a:lnRef>
+            <a:fillRef idx="1">
+              <a:schemeClr val="accent1"/>
+            </a:fillRef>
+            <a:effectRef idx="0">
+              <a:schemeClr val="accent1"/>
+            </a:effectRef>
+            <a:fontRef idx="minor">
+              <a:schemeClr val="lt1"/>
+            </a:fontRef>
+          </p:style>
+          <p:txBody>
+            <a:bodyPr rtlCol="0" anchor="ctr"/>
+            <a:lstStyle/>
+            <a:p>
+              <a:pPr algn="ctr"/>
+              <a:endParaRPr lang="en-US" sz="1100"/>
+            </a:p>
+          </p:txBody>
+        </p:sp>
+        <p:sp>
+          <p:nvSpPr>
+            <p:cNvPr id="14" name="Rectangle 13"/>
+            <p:cNvSpPr/>
+            <p:nvPr/>
+          </p:nvSpPr>
+          <p:spPr>
+            <a:xfrm>
+              <a:off x="6176977" y="3365498"/>
+              <a:ext cx="120650" cy="111125"/>
+            </a:xfrm>
+            <a:prstGeom prst="rect">
+              <a:avLst/>
+            </a:prstGeom>
+            <a:solidFill>
+              <a:schemeClr val="accent4">
+                <a:lumMod val="60000"/>
+                <a:lumOff val="40000"/>
+              </a:schemeClr>
+            </a:solidFill>
+            <a:ln>
+              <a:solidFill>
+                <a:srgbClr val="00B050"/>
+              </a:solidFill>
+            </a:ln>
+          </p:spPr>
+          <p:style>
+            <a:lnRef idx="2">
+              <a:schemeClr val="accent1">
+                <a:shade val="50000"/>
+              </a:schemeClr>
+            </a:lnRef>
+            <a:fillRef idx="1">
+              <a:schemeClr val="accent1"/>
+            </a:fillRef>
+            <a:effectRef idx="0">
+              <a:schemeClr val="accent1"/>
+            </a:effectRef>
+            <a:fontRef idx="minor">
+              <a:schemeClr val="lt1"/>
+            </a:fontRef>
+          </p:style>
+          <p:txBody>
+            <a:bodyPr rtlCol="0" anchor="ctr"/>
+            <a:lstStyle/>
+            <a:p>
+              <a:pPr algn="ctr"/>
+              <a:endParaRPr lang="en-US" sz="1100"/>
+            </a:p>
+          </p:txBody>
+        </p:sp>
+        <p:sp>
+          <p:nvSpPr>
+            <p:cNvPr id="2" name="TextBox 1"/>
+            <p:cNvSpPr txBox="1"/>
+            <p:nvPr/>
+          </p:nvSpPr>
+          <p:spPr>
+            <a:xfrm>
+              <a:off x="5353794" y="2548861"/>
+              <a:ext cx="1611406" cy="687546"/>
+            </a:xfrm>
+            <a:prstGeom prst="rect">
+              <a:avLst/>
+            </a:prstGeom>
+            <a:noFill/>
+          </p:spPr>
+          <p:txBody>
+            <a:bodyPr wrap="square" rtlCol="0">
+              <a:spAutoFit/>
+            </a:bodyPr>
+            <a:lstStyle/>
+            <a:p>
+              <a:pPr algn="ctr">
+                <a:lnSpc>
+                  <a:spcPct val="80000"/>
+                </a:lnSpc>
+              </a:pPr>
+              <a:r>
+                <a:rPr lang="en-US" sz="1000" dirty="0" smtClean="0"/>
+                <a:t>programming models</a:t>
+              </a:r>
+              <a:endParaRPr lang="en-US" sz="1000" dirty="0"/>
+            </a:p>
+          </p:txBody>
+        </p:sp>
+        <p:sp>
+          <p:nvSpPr>
+            <p:cNvPr id="17" name="TextBox 16"/>
+            <p:cNvSpPr txBox="1"/>
+            <p:nvPr/>
+          </p:nvSpPr>
+          <p:spPr>
+            <a:xfrm>
+              <a:off x="5334754" y="2126211"/>
+              <a:ext cx="1611406" cy="687546"/>
+            </a:xfrm>
+            <a:prstGeom prst="rect">
+              <a:avLst/>
+            </a:prstGeom>
+            <a:noFill/>
+          </p:spPr>
+          <p:txBody>
+            <a:bodyPr wrap="square" rtlCol="0">
+              <a:spAutoFit/>
+            </a:bodyPr>
+            <a:lstStyle/>
+            <a:p>
+              <a:pPr algn="ctr">
+                <a:lnSpc>
+                  <a:spcPct val="80000"/>
+                </a:lnSpc>
+              </a:pPr>
+              <a:r>
+                <a:rPr lang="en-US" sz="1000" dirty="0"/>
+                <a:t>t</a:t>
+              </a:r>
+              <a:r>
+                <a:rPr lang="en-US" sz="1000" dirty="0" smtClean="0"/>
+                <a:t>echnology</a:t>
+              </a:r>
+              <a:br>
+                <a:rPr lang="en-US" sz="1000" dirty="0" smtClean="0"/>
+              </a:br>
+              <a:r>
+                <a:rPr lang="en-US" sz="1000" dirty="0" smtClean="0"/>
+                <a:t>stack adapters</a:t>
+              </a:r>
+              <a:endParaRPr lang="en-US" sz="1000" dirty="0"/>
+            </a:p>
+          </p:txBody>
+        </p:sp>
+        <p:sp>
+          <p:nvSpPr>
+            <p:cNvPr id="31" name="Rectangle 30"/>
+            <p:cNvSpPr/>
+            <p:nvPr/>
+          </p:nvSpPr>
+          <p:spPr>
+            <a:xfrm>
+              <a:off x="4876799" y="3754876"/>
+              <a:ext cx="2647951" cy="929626"/>
+            </a:xfrm>
+            <a:prstGeom prst="rect">
+              <a:avLst/>
+            </a:prstGeom>
+            <a:solidFill>
+              <a:schemeClr val="bg1"/>
+            </a:solidFill>
+            <a:ln>
+              <a:solidFill>
+                <a:schemeClr val="bg1"/>
+              </a:solidFill>
+            </a:ln>
+          </p:spPr>
+          <p:style>
+            <a:lnRef idx="2">
+              <a:schemeClr val="accent1">
+                <a:shade val="50000"/>
+              </a:schemeClr>
+            </a:lnRef>
+            <a:fillRef idx="1">
+              <a:schemeClr val="accent1"/>
+            </a:fillRef>
+            <a:effectRef idx="0">
+              <a:schemeClr val="accent1"/>
+            </a:effectRef>
+            <a:fontRef idx="minor">
+              <a:schemeClr val="lt1"/>
+            </a:fontRef>
+          </p:style>
+          <p:txBody>
+            <a:bodyPr lIns="0" tIns="0" rIns="0" bIns="0" rtlCol="0" anchor="t"/>
+            <a:lstStyle/>
+            <a:p>
+              <a:pPr algn="ctr">
+                <a:lnSpc>
+                  <a:spcPct val="80000"/>
+                </a:lnSpc>
+              </a:pPr>
+              <a:endParaRPr lang="en-US" sz="1000" dirty="0">
+                <a:solidFill>
+                  <a:schemeClr val="tx1"/>
+                </a:solidFill>
+              </a:endParaRPr>
+            </a:p>
+          </p:txBody>
+        </p:sp>
+        <p:sp>
+          <p:nvSpPr>
+            <p:cNvPr id="33" name="Line Callout 2 (No Border) 32"/>
+            <p:cNvSpPr/>
+            <p:nvPr/>
+          </p:nvSpPr>
+          <p:spPr>
+            <a:xfrm>
+              <a:off x="6499124" y="3878399"/>
+              <a:ext cx="1587711" cy="236330"/>
+            </a:xfrm>
+            <a:prstGeom prst="callout2">
+              <a:avLst>
+                <a:gd name="adj1" fmla="val 18750"/>
+                <a:gd name="adj2" fmla="val -8333"/>
+                <a:gd name="adj3" fmla="val 18750"/>
+                <a:gd name="adj4" fmla="val -16667"/>
+                <a:gd name="adj5" fmla="val -99768"/>
+                <a:gd name="adj6" fmla="val -25388"/>
+              </a:avLst>
+            </a:prstGeom>
+            <a:solidFill>
+              <a:schemeClr val="bg1"/>
+            </a:solidFill>
+          </p:spPr>
+          <p:style>
+            <a:lnRef idx="2">
+              <a:schemeClr val="accent1">
+                <a:shade val="50000"/>
+              </a:schemeClr>
+            </a:lnRef>
+            <a:fillRef idx="1">
+              <a:schemeClr val="accent1"/>
+            </a:fillRef>
+            <a:effectRef idx="0">
+              <a:schemeClr val="accent1"/>
+            </a:effectRef>
+            <a:fontRef idx="minor">
+              <a:schemeClr val="lt1"/>
+            </a:fontRef>
+          </p:style>
+          <p:txBody>
+            <a:bodyPr lIns="0" tIns="0" rIns="0" bIns="0" rtlCol="0" anchor="ctr"/>
+            <a:lstStyle/>
+            <a:p>
+              <a:pPr>
+                <a:lnSpc>
+                  <a:spcPct val="80000"/>
+                </a:lnSpc>
+              </a:pPr>
+              <a:r>
+                <a:rPr lang="en-US" sz="1000" dirty="0" smtClean="0">
+                  <a:solidFill>
+                    <a:schemeClr val="tx1"/>
+                  </a:solidFill>
+                </a:rPr>
+                <a:t>domain </a:t>
+              </a:r>
+              <a:r>
+                <a:rPr lang="ru-RU" sz="1000" dirty="0" smtClean="0">
+                  <a:solidFill>
+                    <a:schemeClr val="tx1"/>
+                  </a:solidFill>
+                </a:rPr>
+                <a:t/>
+              </a:r>
+              <a:br>
+                <a:rPr lang="ru-RU" sz="1000" dirty="0" smtClean="0">
+                  <a:solidFill>
+                    <a:schemeClr val="tx1"/>
+                  </a:solidFill>
+                </a:rPr>
+              </a:br>
+              <a:r>
+                <a:rPr lang="en-US" sz="1000" dirty="0" smtClean="0">
+                  <a:solidFill>
+                    <a:schemeClr val="tx1"/>
+                  </a:solidFill>
+                </a:rPr>
+                <a:t>building blocks</a:t>
+              </a:r>
+              <a:endParaRPr lang="en-US" sz="1000" dirty="0">
+                <a:solidFill>
+                  <a:schemeClr val="tx1"/>
+                </a:solidFill>
+              </a:endParaRPr>
+            </a:p>
+          </p:txBody>
+        </p:sp>
+      </p:grpSp>
+    </p:spTree>
+    <p:extLst>
+      <p:ext uri="{BB962C8B-B14F-4D97-AF65-F5344CB8AC3E}">
+        <p14:creationId xmlns:p14="http://schemas.microsoft.com/office/powerpoint/2010/main" val="3768332096"/>
       </p:ext>
     </p:extLst>
   </p:cSld>

</xml_diff>